<commit_message>
Add brand + swagger UI menu to header, refine layout
</commit_message>
<xml_diff>
--- a/Documentation/LogoAndIcon.pptx
+++ b/Documentation/LogoAndIcon.pptx
@@ -5,10 +5,11 @@
     <p:sldMasterId id="2147483648" r:id="rId1"/>
   </p:sldMasterIdLst>
   <p:notesMasterIdLst>
-    <p:notesMasterId r:id="rId3"/>
+    <p:notesMasterId r:id="rId4"/>
   </p:notesMasterIdLst>
   <p:sldIdLst>
     <p:sldId id="256" r:id="rId2"/>
+    <p:sldId id="257" r:id="rId3"/>
   </p:sldIdLst>
   <p:sldSz cx="12192000" cy="6858000"/>
   <p:notesSz cx="6858000" cy="9144000"/>
@@ -208,7 +209,7 @@
           <a:p>
             <a:fld id="{41868957-71B5-B744-A5F0-F5DD149310A2}" type="datetimeFigureOut">
               <a:rPr lang="en-US" smtClean="0"/>
-              <a:t>2/19/23</a:t>
+              <a:t>2/20/23</a:t>
             </a:fld>
             <a:endParaRPr lang="en-US"/>
           </a:p>
@@ -559,6 +560,90 @@
 </p:notes>
 </file>
 
+<file path=ppt/notesSlides/notesSlide2.xml><?xml version="1.0" encoding="utf-8"?>
+<p:notes xmlns:a="http://schemas.openxmlformats.org/drawingml/2006/main" xmlns:r="http://schemas.openxmlformats.org/officeDocument/2006/relationships" xmlns:p="http://schemas.openxmlformats.org/presentationml/2006/main">
+  <p:cSld>
+    <p:spTree>
+      <p:nvGrpSpPr>
+        <p:cNvPr id="1" name=""/>
+        <p:cNvGrpSpPr/>
+        <p:nvPr/>
+      </p:nvGrpSpPr>
+      <p:grpSpPr>
+        <a:xfrm>
+          <a:off x="0" y="0"/>
+          <a:ext cx="0" cy="0"/>
+          <a:chOff x="0" y="0"/>
+          <a:chExt cx="0" cy="0"/>
+        </a:xfrm>
+      </p:grpSpPr>
+      <p:sp>
+        <p:nvSpPr>
+          <p:cNvPr id="2" name="Slide Image Placeholder 1"/>
+          <p:cNvSpPr>
+            <a:spLocks noGrp="1" noRot="1" noChangeAspect="1"/>
+          </p:cNvSpPr>
+          <p:nvPr>
+            <p:ph type="sldImg"/>
+          </p:nvPr>
+        </p:nvSpPr>
+        <p:spPr/>
+      </p:sp>
+      <p:sp>
+        <p:nvSpPr>
+          <p:cNvPr id="3" name="Notes Placeholder 2"/>
+          <p:cNvSpPr>
+            <a:spLocks noGrp="1"/>
+          </p:cNvSpPr>
+          <p:nvPr>
+            <p:ph type="body" idx="1"/>
+          </p:nvPr>
+        </p:nvSpPr>
+        <p:spPr/>
+        <p:txBody>
+          <a:bodyPr/>
+          <a:lstStyle/>
+          <a:p>
+            <a:endParaRPr lang="en-US" dirty="0"/>
+          </a:p>
+        </p:txBody>
+      </p:sp>
+      <p:sp>
+        <p:nvSpPr>
+          <p:cNvPr id="4" name="Slide Number Placeholder 3"/>
+          <p:cNvSpPr>
+            <a:spLocks noGrp="1"/>
+          </p:cNvSpPr>
+          <p:nvPr>
+            <p:ph type="sldNum" sz="quarter" idx="5"/>
+          </p:nvPr>
+        </p:nvSpPr>
+        <p:spPr/>
+        <p:txBody>
+          <a:bodyPr/>
+          <a:lstStyle/>
+          <a:p>
+            <a:fld id="{557982F0-C448-DF45-BEC0-A00CF63BD632}" type="slidenum">
+              <a:rPr lang="en-US" smtClean="0"/>
+              <a:t>2</a:t>
+            </a:fld>
+            <a:endParaRPr lang="en-US"/>
+          </a:p>
+        </p:txBody>
+      </p:sp>
+    </p:spTree>
+    <p:extLst>
+      <p:ext uri="{BB962C8B-B14F-4D97-AF65-F5344CB8AC3E}">
+        <p14:creationId xmlns:p14="http://schemas.microsoft.com/office/powerpoint/2010/main" val="1953788861"/>
+      </p:ext>
+    </p:extLst>
+  </p:cSld>
+  <p:clrMapOvr>
+    <a:masterClrMapping/>
+  </p:clrMapOvr>
+</p:notes>
+</file>
+
 <file path=ppt/slideLayouts/slideLayout1.xml><?xml version="1.0" encoding="utf-8"?>
 <p:sldLayout xmlns:a="http://schemas.openxmlformats.org/drawingml/2006/main" xmlns:r="http://schemas.openxmlformats.org/officeDocument/2006/relationships" xmlns:p="http://schemas.openxmlformats.org/presentationml/2006/main" type="title" preserve="1">
   <p:cSld name="Title Slide">
@@ -706,7 +791,7 @@
           <a:p>
             <a:fld id="{8EB54ACD-D2A0-0042-ACD0-C4ED6BC68E8D}" type="datetimeFigureOut">
               <a:rPr lang="en-US" smtClean="0"/>
-              <a:t>2/19/23</a:t>
+              <a:t>2/20/23</a:t>
             </a:fld>
             <a:endParaRPr lang="en-US"/>
           </a:p>
@@ -904,7 +989,7 @@
           <a:p>
             <a:fld id="{8EB54ACD-D2A0-0042-ACD0-C4ED6BC68E8D}" type="datetimeFigureOut">
               <a:rPr lang="en-US" smtClean="0"/>
-              <a:t>2/19/23</a:t>
+              <a:t>2/20/23</a:t>
             </a:fld>
             <a:endParaRPr lang="en-US"/>
           </a:p>
@@ -1112,7 +1197,7 @@
           <a:p>
             <a:fld id="{8EB54ACD-D2A0-0042-ACD0-C4ED6BC68E8D}" type="datetimeFigureOut">
               <a:rPr lang="en-US" smtClean="0"/>
-              <a:t>2/19/23</a:t>
+              <a:t>2/20/23</a:t>
             </a:fld>
             <a:endParaRPr lang="en-US"/>
           </a:p>
@@ -1310,7 +1395,7 @@
           <a:p>
             <a:fld id="{8EB54ACD-D2A0-0042-ACD0-C4ED6BC68E8D}" type="datetimeFigureOut">
               <a:rPr lang="en-US" smtClean="0"/>
-              <a:t>2/19/23</a:t>
+              <a:t>2/20/23</a:t>
             </a:fld>
             <a:endParaRPr lang="en-US"/>
           </a:p>
@@ -1585,7 +1670,7 @@
           <a:p>
             <a:fld id="{8EB54ACD-D2A0-0042-ACD0-C4ED6BC68E8D}" type="datetimeFigureOut">
               <a:rPr lang="en-US" smtClean="0"/>
-              <a:t>2/19/23</a:t>
+              <a:t>2/20/23</a:t>
             </a:fld>
             <a:endParaRPr lang="en-US"/>
           </a:p>
@@ -1850,7 +1935,7 @@
           <a:p>
             <a:fld id="{8EB54ACD-D2A0-0042-ACD0-C4ED6BC68E8D}" type="datetimeFigureOut">
               <a:rPr lang="en-US" smtClean="0"/>
-              <a:t>2/19/23</a:t>
+              <a:t>2/20/23</a:t>
             </a:fld>
             <a:endParaRPr lang="en-US"/>
           </a:p>
@@ -2262,7 +2347,7 @@
           <a:p>
             <a:fld id="{8EB54ACD-D2A0-0042-ACD0-C4ED6BC68E8D}" type="datetimeFigureOut">
               <a:rPr lang="en-US" smtClean="0"/>
-              <a:t>2/19/23</a:t>
+              <a:t>2/20/23</a:t>
             </a:fld>
             <a:endParaRPr lang="en-US"/>
           </a:p>
@@ -2403,7 +2488,7 @@
           <a:p>
             <a:fld id="{8EB54ACD-D2A0-0042-ACD0-C4ED6BC68E8D}" type="datetimeFigureOut">
               <a:rPr lang="en-US" smtClean="0"/>
-              <a:t>2/19/23</a:t>
+              <a:t>2/20/23</a:t>
             </a:fld>
             <a:endParaRPr lang="en-US"/>
           </a:p>
@@ -2516,7 +2601,7 @@
           <a:p>
             <a:fld id="{8EB54ACD-D2A0-0042-ACD0-C4ED6BC68E8D}" type="datetimeFigureOut">
               <a:rPr lang="en-US" smtClean="0"/>
-              <a:t>2/19/23</a:t>
+              <a:t>2/20/23</a:t>
             </a:fld>
             <a:endParaRPr lang="en-US"/>
           </a:p>
@@ -2827,7 +2912,7 @@
           <a:p>
             <a:fld id="{8EB54ACD-D2A0-0042-ACD0-C4ED6BC68E8D}" type="datetimeFigureOut">
               <a:rPr lang="en-US" smtClean="0"/>
-              <a:t>2/19/23</a:t>
+              <a:t>2/20/23</a:t>
             </a:fld>
             <a:endParaRPr lang="en-US"/>
           </a:p>
@@ -3115,7 +3200,7 @@
           <a:p>
             <a:fld id="{8EB54ACD-D2A0-0042-ACD0-C4ED6BC68E8D}" type="datetimeFigureOut">
               <a:rPr lang="en-US" smtClean="0"/>
-              <a:t>2/19/23</a:t>
+              <a:t>2/20/23</a:t>
             </a:fld>
             <a:endParaRPr lang="en-US"/>
           </a:p>
@@ -3356,7 +3441,7 @@
           <a:p>
             <a:fld id="{8EB54ACD-D2A0-0042-ACD0-C4ED6BC68E8D}" type="datetimeFigureOut">
               <a:rPr lang="en-US" smtClean="0"/>
-              <a:t>2/19/23</a:t>
+              <a:t>2/20/23</a:t>
             </a:fld>
             <a:endParaRPr lang="en-US"/>
           </a:p>
@@ -3773,12 +3858,2214 @@
           <a:chExt cx="0" cy="0"/>
         </a:xfrm>
       </p:grpSpPr>
+      <p:sp>
+        <p:nvSpPr>
+          <p:cNvPr id="74" name="Rectangle 73">
+            <a:extLst>
+              <a:ext uri="{FF2B5EF4-FFF2-40B4-BE49-F238E27FC236}">
+                <a16:creationId xmlns:a16="http://schemas.microsoft.com/office/drawing/2014/main" id="{360073C8-E342-2265-1634-3B091E2438E5}"/>
+              </a:ext>
+            </a:extLst>
+          </p:cNvPr>
+          <p:cNvSpPr/>
+          <p:nvPr/>
+        </p:nvSpPr>
+        <p:spPr>
+          <a:xfrm>
+            <a:off x="1536700" y="2259000"/>
+            <a:ext cx="3960000" cy="2340000"/>
+          </a:xfrm>
+          <a:prstGeom prst="rect">
+            <a:avLst/>
+          </a:prstGeom>
+          <a:solidFill>
+            <a:srgbClr val="1C1917"/>
+          </a:solidFill>
+        </p:spPr>
+        <p:style>
+          <a:lnRef idx="2">
+            <a:schemeClr val="accent1">
+              <a:shade val="50000"/>
+            </a:schemeClr>
+          </a:lnRef>
+          <a:fillRef idx="1">
+            <a:schemeClr val="accent1"/>
+          </a:fillRef>
+          <a:effectRef idx="0">
+            <a:schemeClr val="accent1"/>
+          </a:effectRef>
+          <a:fontRef idx="minor">
+            <a:schemeClr val="lt1"/>
+          </a:fontRef>
+        </p:style>
+        <p:txBody>
+          <a:bodyPr rtlCol="0" anchor="ctr"/>
+          <a:lstStyle/>
+          <a:p>
+            <a:pPr algn="ctr"/>
+            <a:endParaRPr lang="en-US"/>
+          </a:p>
+        </p:txBody>
+      </p:sp>
       <p:grpSp>
         <p:nvGrpSpPr>
-          <p:cNvPr id="75" name="Group 74">
+          <p:cNvPr id="73" name="Group 72">
             <a:extLst>
               <a:ext uri="{FF2B5EF4-FFF2-40B4-BE49-F238E27FC236}">
-                <a16:creationId xmlns:a16="http://schemas.microsoft.com/office/drawing/2014/main" id="{0457F5A0-FAA8-9F82-3417-BA15D97AB431}"/>
+                <a16:creationId xmlns:a16="http://schemas.microsoft.com/office/drawing/2014/main" id="{15B32E12-D30A-6034-1988-5F76E37FE212}"/>
+              </a:ext>
+            </a:extLst>
+          </p:cNvPr>
+          <p:cNvGrpSpPr/>
+          <p:nvPr/>
+        </p:nvGrpSpPr>
+        <p:grpSpPr>
+          <a:xfrm rot="20700000">
+            <a:off x="1896700" y="2889000"/>
+            <a:ext cx="3240000" cy="1080000"/>
+            <a:chOff x="4476000" y="2686682"/>
+            <a:chExt cx="3240000" cy="1080000"/>
+          </a:xfrm>
+        </p:grpSpPr>
+        <p:sp>
+          <p:nvSpPr>
+            <p:cNvPr id="4" name="Rounded Rectangle 3">
+              <a:extLst>
+                <a:ext uri="{FF2B5EF4-FFF2-40B4-BE49-F238E27FC236}">
+                  <a16:creationId xmlns:a16="http://schemas.microsoft.com/office/drawing/2014/main" id="{0187774A-DAA8-533D-008F-91FBDC58FF8C}"/>
+                </a:ext>
+              </a:extLst>
+            </p:cNvPr>
+            <p:cNvSpPr>
+              <a:spLocks noChangeAspect="1"/>
+            </p:cNvSpPr>
+            <p:nvPr/>
+          </p:nvSpPr>
+          <p:spPr>
+            <a:xfrm>
+              <a:off x="4476000" y="2686682"/>
+              <a:ext cx="3240000" cy="1080000"/>
+            </a:xfrm>
+            <a:prstGeom prst="roundRect">
+              <a:avLst>
+                <a:gd name="adj" fmla="val 32905"/>
+              </a:avLst>
+            </a:prstGeom>
+            <a:noFill/>
+            <a:ln w="101600">
+              <a:solidFill>
+                <a:srgbClr val="E7E5E4"/>
+              </a:solidFill>
+            </a:ln>
+          </p:spPr>
+          <p:style>
+            <a:lnRef idx="2">
+              <a:schemeClr val="accent1">
+                <a:shade val="50000"/>
+              </a:schemeClr>
+            </a:lnRef>
+            <a:fillRef idx="1">
+              <a:schemeClr val="accent1"/>
+            </a:fillRef>
+            <a:effectRef idx="0">
+              <a:schemeClr val="accent1"/>
+            </a:effectRef>
+            <a:fontRef idx="minor">
+              <a:schemeClr val="lt1"/>
+            </a:fontRef>
+          </p:style>
+          <p:txBody>
+            <a:bodyPr rtlCol="0" anchor="ctr"/>
+            <a:lstStyle/>
+            <a:p>
+              <a:pPr algn="ctr"/>
+              <a:endParaRPr lang="en-US"/>
+            </a:p>
+          </p:txBody>
+        </p:sp>
+        <p:sp>
+          <p:nvSpPr>
+            <p:cNvPr id="5" name="Rectangle 4">
+              <a:extLst>
+                <a:ext uri="{FF2B5EF4-FFF2-40B4-BE49-F238E27FC236}">
+                  <a16:creationId xmlns:a16="http://schemas.microsoft.com/office/drawing/2014/main" id="{C953D804-B968-0F9F-44D7-4278AD7E051F}"/>
+                </a:ext>
+              </a:extLst>
+            </p:cNvPr>
+            <p:cNvSpPr>
+              <a:spLocks noChangeAspect="1"/>
+            </p:cNvSpPr>
+            <p:nvPr/>
+          </p:nvSpPr>
+          <p:spPr>
+            <a:xfrm>
+              <a:off x="5556000" y="2686682"/>
+              <a:ext cx="1080000" cy="1080000"/>
+            </a:xfrm>
+            <a:prstGeom prst="rect">
+              <a:avLst/>
+            </a:prstGeom>
+            <a:noFill/>
+            <a:ln w="50800">
+              <a:solidFill>
+                <a:srgbClr val="E7E5E4"/>
+              </a:solidFill>
+            </a:ln>
+          </p:spPr>
+          <p:style>
+            <a:lnRef idx="2">
+              <a:schemeClr val="accent1">
+                <a:shade val="50000"/>
+              </a:schemeClr>
+            </a:lnRef>
+            <a:fillRef idx="1">
+              <a:schemeClr val="accent1"/>
+            </a:fillRef>
+            <a:effectRef idx="0">
+              <a:schemeClr val="accent1"/>
+            </a:effectRef>
+            <a:fontRef idx="minor">
+              <a:schemeClr val="lt1"/>
+            </a:fontRef>
+          </p:style>
+          <p:txBody>
+            <a:bodyPr rtlCol="0" anchor="ctr"/>
+            <a:lstStyle/>
+            <a:p>
+              <a:pPr algn="ctr"/>
+              <a:endParaRPr lang="en-US"/>
+            </a:p>
+          </p:txBody>
+        </p:sp>
+        <p:sp>
+          <p:nvSpPr>
+            <p:cNvPr id="6" name="Double Brace 5">
+              <a:extLst>
+                <a:ext uri="{FF2B5EF4-FFF2-40B4-BE49-F238E27FC236}">
+                  <a16:creationId xmlns:a16="http://schemas.microsoft.com/office/drawing/2014/main" id="{3C49175B-C494-F0E0-C105-3236BA6C91DD}"/>
+                </a:ext>
+              </a:extLst>
+            </p:cNvPr>
+            <p:cNvSpPr/>
+            <p:nvPr/>
+          </p:nvSpPr>
+          <p:spPr>
+            <a:xfrm>
+              <a:off x="5718000" y="2866682"/>
+              <a:ext cx="756000" cy="720000"/>
+            </a:xfrm>
+            <a:prstGeom prst="bracePair">
+              <a:avLst>
+                <a:gd name="adj" fmla="val 17032"/>
+              </a:avLst>
+            </a:prstGeom>
+            <a:ln w="76200">
+              <a:solidFill>
+                <a:srgbClr val="E7E5E4"/>
+              </a:solidFill>
+            </a:ln>
+          </p:spPr>
+          <p:style>
+            <a:lnRef idx="1">
+              <a:schemeClr val="accent1"/>
+            </a:lnRef>
+            <a:fillRef idx="0">
+              <a:schemeClr val="accent1"/>
+            </a:fillRef>
+            <a:effectRef idx="0">
+              <a:schemeClr val="accent1"/>
+            </a:effectRef>
+            <a:fontRef idx="minor">
+              <a:schemeClr val="tx1"/>
+            </a:fontRef>
+          </p:style>
+          <p:txBody>
+            <a:bodyPr rtlCol="0" anchor="ctr"/>
+            <a:lstStyle/>
+            <a:p>
+              <a:pPr algn="ctr"/>
+              <a:endParaRPr lang="en-US"/>
+            </a:p>
+          </p:txBody>
+        </p:sp>
+        <p:sp>
+          <p:nvSpPr>
+            <p:cNvPr id="9" name="Oval 8">
+              <a:extLst>
+                <a:ext uri="{FF2B5EF4-FFF2-40B4-BE49-F238E27FC236}">
+                  <a16:creationId xmlns:a16="http://schemas.microsoft.com/office/drawing/2014/main" id="{E701AEA7-4E27-9813-F418-0E1212FCC89A}"/>
+                </a:ext>
+              </a:extLst>
+            </p:cNvPr>
+            <p:cNvSpPr>
+              <a:spLocks noChangeAspect="1"/>
+            </p:cNvSpPr>
+            <p:nvPr/>
+          </p:nvSpPr>
+          <p:spPr>
+            <a:xfrm>
+              <a:off x="5310282" y="2866682"/>
+              <a:ext cx="72000" cy="72000"/>
+            </a:xfrm>
+            <a:prstGeom prst="ellipse">
+              <a:avLst/>
+            </a:prstGeom>
+            <a:solidFill>
+              <a:srgbClr val="E7E5E4"/>
+            </a:solidFill>
+            <a:ln w="6350">
+              <a:solidFill>
+                <a:srgbClr val="E7E5E4"/>
+              </a:solidFill>
+            </a:ln>
+          </p:spPr>
+          <p:style>
+            <a:lnRef idx="2">
+              <a:schemeClr val="accent1">
+                <a:shade val="50000"/>
+              </a:schemeClr>
+            </a:lnRef>
+            <a:fillRef idx="1">
+              <a:schemeClr val="accent1"/>
+            </a:fillRef>
+            <a:effectRef idx="0">
+              <a:schemeClr val="accent1"/>
+            </a:effectRef>
+            <a:fontRef idx="minor">
+              <a:schemeClr val="lt1"/>
+            </a:fontRef>
+          </p:style>
+          <p:txBody>
+            <a:bodyPr rtlCol="0" anchor="ctr"/>
+            <a:lstStyle/>
+            <a:p>
+              <a:pPr algn="ctr"/>
+              <a:endParaRPr lang="en-US"/>
+            </a:p>
+          </p:txBody>
+        </p:sp>
+        <p:sp>
+          <p:nvSpPr>
+            <p:cNvPr id="12" name="Oval 11">
+              <a:extLst>
+                <a:ext uri="{FF2B5EF4-FFF2-40B4-BE49-F238E27FC236}">
+                  <a16:creationId xmlns:a16="http://schemas.microsoft.com/office/drawing/2014/main" id="{73948681-D8DE-1B6D-08B7-47842125F4EE}"/>
+                </a:ext>
+              </a:extLst>
+            </p:cNvPr>
+            <p:cNvSpPr>
+              <a:spLocks noChangeAspect="1"/>
+            </p:cNvSpPr>
+            <p:nvPr/>
+          </p:nvSpPr>
+          <p:spPr>
+            <a:xfrm>
+              <a:off x="5310282" y="3082682"/>
+              <a:ext cx="72000" cy="72000"/>
+            </a:xfrm>
+            <a:prstGeom prst="ellipse">
+              <a:avLst/>
+            </a:prstGeom>
+            <a:solidFill>
+              <a:srgbClr val="E7E5E4"/>
+            </a:solidFill>
+            <a:ln w="6350">
+              <a:solidFill>
+                <a:srgbClr val="E7E5E4"/>
+              </a:solidFill>
+            </a:ln>
+          </p:spPr>
+          <p:style>
+            <a:lnRef idx="2">
+              <a:schemeClr val="accent1">
+                <a:shade val="50000"/>
+              </a:schemeClr>
+            </a:lnRef>
+            <a:fillRef idx="1">
+              <a:schemeClr val="accent1"/>
+            </a:fillRef>
+            <a:effectRef idx="0">
+              <a:schemeClr val="accent1"/>
+            </a:effectRef>
+            <a:fontRef idx="minor">
+              <a:schemeClr val="lt1"/>
+            </a:fontRef>
+          </p:style>
+          <p:txBody>
+            <a:bodyPr rtlCol="0" anchor="ctr"/>
+            <a:lstStyle/>
+            <a:p>
+              <a:pPr algn="ctr"/>
+              <a:endParaRPr lang="en-US"/>
+            </a:p>
+          </p:txBody>
+        </p:sp>
+        <p:sp>
+          <p:nvSpPr>
+            <p:cNvPr id="13" name="Oval 12">
+              <a:extLst>
+                <a:ext uri="{FF2B5EF4-FFF2-40B4-BE49-F238E27FC236}">
+                  <a16:creationId xmlns:a16="http://schemas.microsoft.com/office/drawing/2014/main" id="{FECFAE95-8BC7-0B96-207C-0814C5929388}"/>
+                </a:ext>
+              </a:extLst>
+            </p:cNvPr>
+            <p:cNvSpPr>
+              <a:spLocks noChangeAspect="1"/>
+            </p:cNvSpPr>
+            <p:nvPr/>
+          </p:nvSpPr>
+          <p:spPr>
+            <a:xfrm>
+              <a:off x="5310282" y="3298682"/>
+              <a:ext cx="72000" cy="72000"/>
+            </a:xfrm>
+            <a:prstGeom prst="ellipse">
+              <a:avLst/>
+            </a:prstGeom>
+            <a:solidFill>
+              <a:srgbClr val="E7E5E4"/>
+            </a:solidFill>
+            <a:ln w="6350">
+              <a:solidFill>
+                <a:srgbClr val="E7E5E4"/>
+              </a:solidFill>
+            </a:ln>
+          </p:spPr>
+          <p:style>
+            <a:lnRef idx="2">
+              <a:schemeClr val="accent1">
+                <a:shade val="50000"/>
+              </a:schemeClr>
+            </a:lnRef>
+            <a:fillRef idx="1">
+              <a:schemeClr val="accent1"/>
+            </a:fillRef>
+            <a:effectRef idx="0">
+              <a:schemeClr val="accent1"/>
+            </a:effectRef>
+            <a:fontRef idx="minor">
+              <a:schemeClr val="lt1"/>
+            </a:fontRef>
+          </p:style>
+          <p:txBody>
+            <a:bodyPr rtlCol="0" anchor="ctr"/>
+            <a:lstStyle/>
+            <a:p>
+              <a:pPr algn="ctr"/>
+              <a:endParaRPr lang="en-US"/>
+            </a:p>
+          </p:txBody>
+        </p:sp>
+        <p:sp>
+          <p:nvSpPr>
+            <p:cNvPr id="14" name="Oval 13">
+              <a:extLst>
+                <a:ext uri="{FF2B5EF4-FFF2-40B4-BE49-F238E27FC236}">
+                  <a16:creationId xmlns:a16="http://schemas.microsoft.com/office/drawing/2014/main" id="{D02D6D35-195E-13FD-CB1F-840B9277C838}"/>
+                </a:ext>
+              </a:extLst>
+            </p:cNvPr>
+            <p:cNvSpPr>
+              <a:spLocks noChangeAspect="1"/>
+            </p:cNvSpPr>
+            <p:nvPr/>
+          </p:nvSpPr>
+          <p:spPr>
+            <a:xfrm>
+              <a:off x="5310282" y="3514682"/>
+              <a:ext cx="72000" cy="72000"/>
+            </a:xfrm>
+            <a:prstGeom prst="ellipse">
+              <a:avLst/>
+            </a:prstGeom>
+            <a:solidFill>
+              <a:srgbClr val="E7E5E4"/>
+            </a:solidFill>
+            <a:ln w="6350">
+              <a:solidFill>
+                <a:srgbClr val="E7E5E4"/>
+              </a:solidFill>
+            </a:ln>
+          </p:spPr>
+          <p:style>
+            <a:lnRef idx="2">
+              <a:schemeClr val="accent1">
+                <a:shade val="50000"/>
+              </a:schemeClr>
+            </a:lnRef>
+            <a:fillRef idx="1">
+              <a:schemeClr val="accent1"/>
+            </a:fillRef>
+            <a:effectRef idx="0">
+              <a:schemeClr val="accent1"/>
+            </a:effectRef>
+            <a:fontRef idx="minor">
+              <a:schemeClr val="lt1"/>
+            </a:fontRef>
+          </p:style>
+          <p:txBody>
+            <a:bodyPr rtlCol="0" anchor="ctr"/>
+            <a:lstStyle/>
+            <a:p>
+              <a:pPr algn="ctr"/>
+              <a:endParaRPr lang="en-US"/>
+            </a:p>
+          </p:txBody>
+        </p:sp>
+        <p:sp>
+          <p:nvSpPr>
+            <p:cNvPr id="18" name="Oval 17">
+              <a:extLst>
+                <a:ext uri="{FF2B5EF4-FFF2-40B4-BE49-F238E27FC236}">
+                  <a16:creationId xmlns:a16="http://schemas.microsoft.com/office/drawing/2014/main" id="{86F47B78-7904-9A5E-C56D-B9D6E90F6DDA}"/>
+                </a:ext>
+              </a:extLst>
+            </p:cNvPr>
+            <p:cNvSpPr>
+              <a:spLocks noChangeAspect="1"/>
+            </p:cNvSpPr>
+            <p:nvPr/>
+          </p:nvSpPr>
+          <p:spPr>
+            <a:xfrm>
+              <a:off x="5103816" y="2866682"/>
+              <a:ext cx="72000" cy="72000"/>
+            </a:xfrm>
+            <a:prstGeom prst="ellipse">
+              <a:avLst/>
+            </a:prstGeom>
+            <a:solidFill>
+              <a:srgbClr val="E7E5E4"/>
+            </a:solidFill>
+            <a:ln w="6350">
+              <a:solidFill>
+                <a:srgbClr val="E7E5E4"/>
+              </a:solidFill>
+            </a:ln>
+          </p:spPr>
+          <p:style>
+            <a:lnRef idx="2">
+              <a:schemeClr val="accent1">
+                <a:shade val="50000"/>
+              </a:schemeClr>
+            </a:lnRef>
+            <a:fillRef idx="1">
+              <a:schemeClr val="accent1"/>
+            </a:fillRef>
+            <a:effectRef idx="0">
+              <a:schemeClr val="accent1"/>
+            </a:effectRef>
+            <a:fontRef idx="minor">
+              <a:schemeClr val="lt1"/>
+            </a:fontRef>
+          </p:style>
+          <p:txBody>
+            <a:bodyPr rtlCol="0" anchor="ctr"/>
+            <a:lstStyle/>
+            <a:p>
+              <a:pPr algn="ctr"/>
+              <a:endParaRPr lang="en-US"/>
+            </a:p>
+          </p:txBody>
+        </p:sp>
+        <p:sp>
+          <p:nvSpPr>
+            <p:cNvPr id="19" name="Oval 18">
+              <a:extLst>
+                <a:ext uri="{FF2B5EF4-FFF2-40B4-BE49-F238E27FC236}">
+                  <a16:creationId xmlns:a16="http://schemas.microsoft.com/office/drawing/2014/main" id="{700155D2-6C4B-3457-D622-239B0712EDB3}"/>
+                </a:ext>
+              </a:extLst>
+            </p:cNvPr>
+            <p:cNvSpPr>
+              <a:spLocks noChangeAspect="1"/>
+            </p:cNvSpPr>
+            <p:nvPr/>
+          </p:nvSpPr>
+          <p:spPr>
+            <a:xfrm>
+              <a:off x="5103816" y="3082682"/>
+              <a:ext cx="72000" cy="72000"/>
+            </a:xfrm>
+            <a:prstGeom prst="ellipse">
+              <a:avLst/>
+            </a:prstGeom>
+            <a:solidFill>
+              <a:srgbClr val="E7E5E4"/>
+            </a:solidFill>
+            <a:ln w="6350">
+              <a:solidFill>
+                <a:srgbClr val="E7E5E4"/>
+              </a:solidFill>
+            </a:ln>
+          </p:spPr>
+          <p:style>
+            <a:lnRef idx="2">
+              <a:schemeClr val="accent1">
+                <a:shade val="50000"/>
+              </a:schemeClr>
+            </a:lnRef>
+            <a:fillRef idx="1">
+              <a:schemeClr val="accent1"/>
+            </a:fillRef>
+            <a:effectRef idx="0">
+              <a:schemeClr val="accent1"/>
+            </a:effectRef>
+            <a:fontRef idx="minor">
+              <a:schemeClr val="lt1"/>
+            </a:fontRef>
+          </p:style>
+          <p:txBody>
+            <a:bodyPr rtlCol="0" anchor="ctr"/>
+            <a:lstStyle/>
+            <a:p>
+              <a:pPr algn="ctr"/>
+              <a:endParaRPr lang="en-US"/>
+            </a:p>
+          </p:txBody>
+        </p:sp>
+        <p:sp>
+          <p:nvSpPr>
+            <p:cNvPr id="20" name="Oval 19">
+              <a:extLst>
+                <a:ext uri="{FF2B5EF4-FFF2-40B4-BE49-F238E27FC236}">
+                  <a16:creationId xmlns:a16="http://schemas.microsoft.com/office/drawing/2014/main" id="{FA463E25-83F3-57C5-9F63-0196F524DACA}"/>
+                </a:ext>
+              </a:extLst>
+            </p:cNvPr>
+            <p:cNvSpPr>
+              <a:spLocks noChangeAspect="1"/>
+            </p:cNvSpPr>
+            <p:nvPr/>
+          </p:nvSpPr>
+          <p:spPr>
+            <a:xfrm>
+              <a:off x="5103816" y="3298682"/>
+              <a:ext cx="72000" cy="72000"/>
+            </a:xfrm>
+            <a:prstGeom prst="ellipse">
+              <a:avLst/>
+            </a:prstGeom>
+            <a:solidFill>
+              <a:srgbClr val="E7E5E4"/>
+            </a:solidFill>
+            <a:ln w="6350">
+              <a:solidFill>
+                <a:srgbClr val="E7E5E4"/>
+              </a:solidFill>
+            </a:ln>
+          </p:spPr>
+          <p:style>
+            <a:lnRef idx="2">
+              <a:schemeClr val="accent1">
+                <a:shade val="50000"/>
+              </a:schemeClr>
+            </a:lnRef>
+            <a:fillRef idx="1">
+              <a:schemeClr val="accent1"/>
+            </a:fillRef>
+            <a:effectRef idx="0">
+              <a:schemeClr val="accent1"/>
+            </a:effectRef>
+            <a:fontRef idx="minor">
+              <a:schemeClr val="lt1"/>
+            </a:fontRef>
+          </p:style>
+          <p:txBody>
+            <a:bodyPr rtlCol="0" anchor="ctr"/>
+            <a:lstStyle/>
+            <a:p>
+              <a:pPr algn="ctr"/>
+              <a:endParaRPr lang="en-US"/>
+            </a:p>
+          </p:txBody>
+        </p:sp>
+        <p:sp>
+          <p:nvSpPr>
+            <p:cNvPr id="21" name="Oval 20">
+              <a:extLst>
+                <a:ext uri="{FF2B5EF4-FFF2-40B4-BE49-F238E27FC236}">
+                  <a16:creationId xmlns:a16="http://schemas.microsoft.com/office/drawing/2014/main" id="{617636AA-9B26-3E90-2E63-5834B52239C6}"/>
+                </a:ext>
+              </a:extLst>
+            </p:cNvPr>
+            <p:cNvSpPr>
+              <a:spLocks noChangeAspect="1"/>
+            </p:cNvSpPr>
+            <p:nvPr/>
+          </p:nvSpPr>
+          <p:spPr>
+            <a:xfrm>
+              <a:off x="5103816" y="3514682"/>
+              <a:ext cx="72000" cy="72000"/>
+            </a:xfrm>
+            <a:prstGeom prst="ellipse">
+              <a:avLst/>
+            </a:prstGeom>
+            <a:solidFill>
+              <a:srgbClr val="E7E5E4"/>
+            </a:solidFill>
+            <a:ln w="6350">
+              <a:solidFill>
+                <a:srgbClr val="E7E5E4"/>
+              </a:solidFill>
+            </a:ln>
+          </p:spPr>
+          <p:style>
+            <a:lnRef idx="2">
+              <a:schemeClr val="accent1">
+                <a:shade val="50000"/>
+              </a:schemeClr>
+            </a:lnRef>
+            <a:fillRef idx="1">
+              <a:schemeClr val="accent1"/>
+            </a:fillRef>
+            <a:effectRef idx="0">
+              <a:schemeClr val="accent1"/>
+            </a:effectRef>
+            <a:fontRef idx="minor">
+              <a:schemeClr val="lt1"/>
+            </a:fontRef>
+          </p:style>
+          <p:txBody>
+            <a:bodyPr rtlCol="0" anchor="ctr"/>
+            <a:lstStyle/>
+            <a:p>
+              <a:pPr algn="ctr"/>
+              <a:endParaRPr lang="en-US"/>
+            </a:p>
+          </p:txBody>
+        </p:sp>
+        <p:sp>
+          <p:nvSpPr>
+            <p:cNvPr id="23" name="Oval 22">
+              <a:extLst>
+                <a:ext uri="{FF2B5EF4-FFF2-40B4-BE49-F238E27FC236}">
+                  <a16:creationId xmlns:a16="http://schemas.microsoft.com/office/drawing/2014/main" id="{D344230C-CA81-BAAA-3078-FBB0B4268ADF}"/>
+                </a:ext>
+              </a:extLst>
+            </p:cNvPr>
+            <p:cNvSpPr>
+              <a:spLocks noChangeAspect="1"/>
+            </p:cNvSpPr>
+            <p:nvPr/>
+          </p:nvSpPr>
+          <p:spPr>
+            <a:xfrm>
+              <a:off x="4897350" y="2866682"/>
+              <a:ext cx="72000" cy="72000"/>
+            </a:xfrm>
+            <a:prstGeom prst="ellipse">
+              <a:avLst/>
+            </a:prstGeom>
+            <a:solidFill>
+              <a:srgbClr val="E7E5E4"/>
+            </a:solidFill>
+            <a:ln w="6350">
+              <a:solidFill>
+                <a:srgbClr val="E7E5E4"/>
+              </a:solidFill>
+            </a:ln>
+          </p:spPr>
+          <p:style>
+            <a:lnRef idx="2">
+              <a:schemeClr val="accent1">
+                <a:shade val="50000"/>
+              </a:schemeClr>
+            </a:lnRef>
+            <a:fillRef idx="1">
+              <a:schemeClr val="accent1"/>
+            </a:fillRef>
+            <a:effectRef idx="0">
+              <a:schemeClr val="accent1"/>
+            </a:effectRef>
+            <a:fontRef idx="minor">
+              <a:schemeClr val="lt1"/>
+            </a:fontRef>
+          </p:style>
+          <p:txBody>
+            <a:bodyPr rtlCol="0" anchor="ctr"/>
+            <a:lstStyle/>
+            <a:p>
+              <a:pPr algn="ctr"/>
+              <a:endParaRPr lang="en-US"/>
+            </a:p>
+          </p:txBody>
+        </p:sp>
+        <p:sp>
+          <p:nvSpPr>
+            <p:cNvPr id="24" name="Oval 23">
+              <a:extLst>
+                <a:ext uri="{FF2B5EF4-FFF2-40B4-BE49-F238E27FC236}">
+                  <a16:creationId xmlns:a16="http://schemas.microsoft.com/office/drawing/2014/main" id="{CD271F28-A3B6-CA4D-31BC-346D0AAEAD83}"/>
+                </a:ext>
+              </a:extLst>
+            </p:cNvPr>
+            <p:cNvSpPr>
+              <a:spLocks noChangeAspect="1"/>
+            </p:cNvSpPr>
+            <p:nvPr/>
+          </p:nvSpPr>
+          <p:spPr>
+            <a:xfrm>
+              <a:off x="4897350" y="3082682"/>
+              <a:ext cx="72000" cy="72000"/>
+            </a:xfrm>
+            <a:prstGeom prst="ellipse">
+              <a:avLst/>
+            </a:prstGeom>
+            <a:solidFill>
+              <a:srgbClr val="E7E5E4"/>
+            </a:solidFill>
+            <a:ln w="6350">
+              <a:solidFill>
+                <a:srgbClr val="E7E5E4"/>
+              </a:solidFill>
+            </a:ln>
+          </p:spPr>
+          <p:style>
+            <a:lnRef idx="2">
+              <a:schemeClr val="accent1">
+                <a:shade val="50000"/>
+              </a:schemeClr>
+            </a:lnRef>
+            <a:fillRef idx="1">
+              <a:schemeClr val="accent1"/>
+            </a:fillRef>
+            <a:effectRef idx="0">
+              <a:schemeClr val="accent1"/>
+            </a:effectRef>
+            <a:fontRef idx="minor">
+              <a:schemeClr val="lt1"/>
+            </a:fontRef>
+          </p:style>
+          <p:txBody>
+            <a:bodyPr rtlCol="0" anchor="ctr"/>
+            <a:lstStyle/>
+            <a:p>
+              <a:pPr algn="ctr"/>
+              <a:endParaRPr lang="en-US"/>
+            </a:p>
+          </p:txBody>
+        </p:sp>
+        <p:sp>
+          <p:nvSpPr>
+            <p:cNvPr id="25" name="Oval 24">
+              <a:extLst>
+                <a:ext uri="{FF2B5EF4-FFF2-40B4-BE49-F238E27FC236}">
+                  <a16:creationId xmlns:a16="http://schemas.microsoft.com/office/drawing/2014/main" id="{E289F51D-F5C5-08DE-2481-F224E31374EE}"/>
+                </a:ext>
+              </a:extLst>
+            </p:cNvPr>
+            <p:cNvSpPr>
+              <a:spLocks noChangeAspect="1"/>
+            </p:cNvSpPr>
+            <p:nvPr/>
+          </p:nvSpPr>
+          <p:spPr>
+            <a:xfrm>
+              <a:off x="4897350" y="3298682"/>
+              <a:ext cx="72000" cy="72000"/>
+            </a:xfrm>
+            <a:prstGeom prst="ellipse">
+              <a:avLst/>
+            </a:prstGeom>
+            <a:solidFill>
+              <a:srgbClr val="E7E5E4"/>
+            </a:solidFill>
+            <a:ln w="6350">
+              <a:solidFill>
+                <a:srgbClr val="E7E5E4"/>
+              </a:solidFill>
+            </a:ln>
+          </p:spPr>
+          <p:style>
+            <a:lnRef idx="2">
+              <a:schemeClr val="accent1">
+                <a:shade val="50000"/>
+              </a:schemeClr>
+            </a:lnRef>
+            <a:fillRef idx="1">
+              <a:schemeClr val="accent1"/>
+            </a:fillRef>
+            <a:effectRef idx="0">
+              <a:schemeClr val="accent1"/>
+            </a:effectRef>
+            <a:fontRef idx="minor">
+              <a:schemeClr val="lt1"/>
+            </a:fontRef>
+          </p:style>
+          <p:txBody>
+            <a:bodyPr rtlCol="0" anchor="ctr"/>
+            <a:lstStyle/>
+            <a:p>
+              <a:pPr algn="ctr"/>
+              <a:endParaRPr lang="en-US"/>
+            </a:p>
+          </p:txBody>
+        </p:sp>
+        <p:sp>
+          <p:nvSpPr>
+            <p:cNvPr id="26" name="Oval 25">
+              <a:extLst>
+                <a:ext uri="{FF2B5EF4-FFF2-40B4-BE49-F238E27FC236}">
+                  <a16:creationId xmlns:a16="http://schemas.microsoft.com/office/drawing/2014/main" id="{F67971F6-0EA7-403D-AC0D-4CB14E754B39}"/>
+                </a:ext>
+              </a:extLst>
+            </p:cNvPr>
+            <p:cNvSpPr>
+              <a:spLocks noChangeAspect="1"/>
+            </p:cNvSpPr>
+            <p:nvPr/>
+          </p:nvSpPr>
+          <p:spPr>
+            <a:xfrm>
+              <a:off x="4897350" y="3514682"/>
+              <a:ext cx="72000" cy="72000"/>
+            </a:xfrm>
+            <a:prstGeom prst="ellipse">
+              <a:avLst/>
+            </a:prstGeom>
+            <a:solidFill>
+              <a:srgbClr val="E7E5E4"/>
+            </a:solidFill>
+            <a:ln w="6350">
+              <a:solidFill>
+                <a:srgbClr val="E7E5E4"/>
+              </a:solidFill>
+            </a:ln>
+          </p:spPr>
+          <p:style>
+            <a:lnRef idx="2">
+              <a:schemeClr val="accent1">
+                <a:shade val="50000"/>
+              </a:schemeClr>
+            </a:lnRef>
+            <a:fillRef idx="1">
+              <a:schemeClr val="accent1"/>
+            </a:fillRef>
+            <a:effectRef idx="0">
+              <a:schemeClr val="accent1"/>
+            </a:effectRef>
+            <a:fontRef idx="minor">
+              <a:schemeClr val="lt1"/>
+            </a:fontRef>
+          </p:style>
+          <p:txBody>
+            <a:bodyPr rtlCol="0" anchor="ctr"/>
+            <a:lstStyle/>
+            <a:p>
+              <a:pPr algn="ctr"/>
+              <a:endParaRPr lang="en-US"/>
+            </a:p>
+          </p:txBody>
+        </p:sp>
+        <p:sp>
+          <p:nvSpPr>
+            <p:cNvPr id="28" name="Oval 27">
+              <a:extLst>
+                <a:ext uri="{FF2B5EF4-FFF2-40B4-BE49-F238E27FC236}">
+                  <a16:creationId xmlns:a16="http://schemas.microsoft.com/office/drawing/2014/main" id="{4F7569CB-D977-1A53-5C8B-0A0F9C42E0C6}"/>
+                </a:ext>
+              </a:extLst>
+            </p:cNvPr>
+            <p:cNvSpPr>
+              <a:spLocks noChangeAspect="1"/>
+            </p:cNvSpPr>
+            <p:nvPr/>
+          </p:nvSpPr>
+          <p:spPr>
+            <a:xfrm>
+              <a:off x="4690884" y="2866682"/>
+              <a:ext cx="72000" cy="72000"/>
+            </a:xfrm>
+            <a:prstGeom prst="ellipse">
+              <a:avLst/>
+            </a:prstGeom>
+            <a:solidFill>
+              <a:srgbClr val="E7E5E4"/>
+            </a:solidFill>
+            <a:ln w="6350">
+              <a:solidFill>
+                <a:srgbClr val="E7E5E4"/>
+              </a:solidFill>
+            </a:ln>
+          </p:spPr>
+          <p:style>
+            <a:lnRef idx="2">
+              <a:schemeClr val="accent1">
+                <a:shade val="50000"/>
+              </a:schemeClr>
+            </a:lnRef>
+            <a:fillRef idx="1">
+              <a:schemeClr val="accent1"/>
+            </a:fillRef>
+            <a:effectRef idx="0">
+              <a:schemeClr val="accent1"/>
+            </a:effectRef>
+            <a:fontRef idx="minor">
+              <a:schemeClr val="lt1"/>
+            </a:fontRef>
+          </p:style>
+          <p:txBody>
+            <a:bodyPr rtlCol="0" anchor="ctr"/>
+            <a:lstStyle/>
+            <a:p>
+              <a:pPr algn="ctr"/>
+              <a:endParaRPr lang="en-US"/>
+            </a:p>
+          </p:txBody>
+        </p:sp>
+        <p:sp>
+          <p:nvSpPr>
+            <p:cNvPr id="29" name="Oval 28">
+              <a:extLst>
+                <a:ext uri="{FF2B5EF4-FFF2-40B4-BE49-F238E27FC236}">
+                  <a16:creationId xmlns:a16="http://schemas.microsoft.com/office/drawing/2014/main" id="{C028C3B1-5FAD-48C5-BA10-E713648677CF}"/>
+                </a:ext>
+              </a:extLst>
+            </p:cNvPr>
+            <p:cNvSpPr>
+              <a:spLocks noChangeAspect="1"/>
+            </p:cNvSpPr>
+            <p:nvPr/>
+          </p:nvSpPr>
+          <p:spPr>
+            <a:xfrm>
+              <a:off x="4690884" y="3082682"/>
+              <a:ext cx="72000" cy="72000"/>
+            </a:xfrm>
+            <a:prstGeom prst="ellipse">
+              <a:avLst/>
+            </a:prstGeom>
+            <a:solidFill>
+              <a:srgbClr val="E7E5E4"/>
+            </a:solidFill>
+            <a:ln w="6350">
+              <a:solidFill>
+                <a:srgbClr val="E7E5E4"/>
+              </a:solidFill>
+            </a:ln>
+          </p:spPr>
+          <p:style>
+            <a:lnRef idx="2">
+              <a:schemeClr val="accent1">
+                <a:shade val="50000"/>
+              </a:schemeClr>
+            </a:lnRef>
+            <a:fillRef idx="1">
+              <a:schemeClr val="accent1"/>
+            </a:fillRef>
+            <a:effectRef idx="0">
+              <a:schemeClr val="accent1"/>
+            </a:effectRef>
+            <a:fontRef idx="minor">
+              <a:schemeClr val="lt1"/>
+            </a:fontRef>
+          </p:style>
+          <p:txBody>
+            <a:bodyPr rtlCol="0" anchor="ctr"/>
+            <a:lstStyle/>
+            <a:p>
+              <a:pPr algn="ctr"/>
+              <a:endParaRPr lang="en-US"/>
+            </a:p>
+          </p:txBody>
+        </p:sp>
+        <p:sp>
+          <p:nvSpPr>
+            <p:cNvPr id="30" name="Oval 29">
+              <a:extLst>
+                <a:ext uri="{FF2B5EF4-FFF2-40B4-BE49-F238E27FC236}">
+                  <a16:creationId xmlns:a16="http://schemas.microsoft.com/office/drawing/2014/main" id="{627CCC90-C220-2AF4-253F-B15A641D5A54}"/>
+                </a:ext>
+              </a:extLst>
+            </p:cNvPr>
+            <p:cNvSpPr>
+              <a:spLocks noChangeAspect="1"/>
+            </p:cNvSpPr>
+            <p:nvPr/>
+          </p:nvSpPr>
+          <p:spPr>
+            <a:xfrm>
+              <a:off x="4690884" y="3298682"/>
+              <a:ext cx="72000" cy="72000"/>
+            </a:xfrm>
+            <a:prstGeom prst="ellipse">
+              <a:avLst/>
+            </a:prstGeom>
+            <a:solidFill>
+              <a:srgbClr val="E7E5E4"/>
+            </a:solidFill>
+            <a:ln w="6350">
+              <a:solidFill>
+                <a:srgbClr val="E7E5E4"/>
+              </a:solidFill>
+            </a:ln>
+          </p:spPr>
+          <p:style>
+            <a:lnRef idx="2">
+              <a:schemeClr val="accent1">
+                <a:shade val="50000"/>
+              </a:schemeClr>
+            </a:lnRef>
+            <a:fillRef idx="1">
+              <a:schemeClr val="accent1"/>
+            </a:fillRef>
+            <a:effectRef idx="0">
+              <a:schemeClr val="accent1"/>
+            </a:effectRef>
+            <a:fontRef idx="minor">
+              <a:schemeClr val="lt1"/>
+            </a:fontRef>
+          </p:style>
+          <p:txBody>
+            <a:bodyPr rtlCol="0" anchor="ctr"/>
+            <a:lstStyle/>
+            <a:p>
+              <a:pPr algn="ctr"/>
+              <a:endParaRPr lang="en-US"/>
+            </a:p>
+          </p:txBody>
+        </p:sp>
+        <p:sp>
+          <p:nvSpPr>
+            <p:cNvPr id="31" name="Oval 30">
+              <a:extLst>
+                <a:ext uri="{FF2B5EF4-FFF2-40B4-BE49-F238E27FC236}">
+                  <a16:creationId xmlns:a16="http://schemas.microsoft.com/office/drawing/2014/main" id="{3F9770B2-D982-8B6A-6210-4FF55F37AB61}"/>
+                </a:ext>
+              </a:extLst>
+            </p:cNvPr>
+            <p:cNvSpPr>
+              <a:spLocks noChangeAspect="1"/>
+            </p:cNvSpPr>
+            <p:nvPr/>
+          </p:nvSpPr>
+          <p:spPr>
+            <a:xfrm>
+              <a:off x="4690884" y="3514682"/>
+              <a:ext cx="72000" cy="72000"/>
+            </a:xfrm>
+            <a:prstGeom prst="ellipse">
+              <a:avLst/>
+            </a:prstGeom>
+            <a:solidFill>
+              <a:srgbClr val="E7E5E4"/>
+            </a:solidFill>
+            <a:ln w="6350">
+              <a:solidFill>
+                <a:srgbClr val="E7E5E4"/>
+              </a:solidFill>
+            </a:ln>
+          </p:spPr>
+          <p:style>
+            <a:lnRef idx="2">
+              <a:schemeClr val="accent1">
+                <a:shade val="50000"/>
+              </a:schemeClr>
+            </a:lnRef>
+            <a:fillRef idx="1">
+              <a:schemeClr val="accent1"/>
+            </a:fillRef>
+            <a:effectRef idx="0">
+              <a:schemeClr val="accent1"/>
+            </a:effectRef>
+            <a:fontRef idx="minor">
+              <a:schemeClr val="lt1"/>
+            </a:fontRef>
+          </p:style>
+          <p:txBody>
+            <a:bodyPr rtlCol="0" anchor="ctr"/>
+            <a:lstStyle/>
+            <a:p>
+              <a:pPr algn="ctr"/>
+              <a:endParaRPr lang="en-US"/>
+            </a:p>
+          </p:txBody>
+        </p:sp>
+        <p:sp>
+          <p:nvSpPr>
+            <p:cNvPr id="57" name="Oval 56">
+              <a:extLst>
+                <a:ext uri="{FF2B5EF4-FFF2-40B4-BE49-F238E27FC236}">
+                  <a16:creationId xmlns:a16="http://schemas.microsoft.com/office/drawing/2014/main" id="{09528893-AED4-568A-81FE-834F4C23D139}"/>
+                </a:ext>
+              </a:extLst>
+            </p:cNvPr>
+            <p:cNvSpPr>
+              <a:spLocks noChangeAspect="1"/>
+            </p:cNvSpPr>
+            <p:nvPr/>
+          </p:nvSpPr>
+          <p:spPr>
+            <a:xfrm>
+              <a:off x="7429116" y="2866682"/>
+              <a:ext cx="72000" cy="72000"/>
+            </a:xfrm>
+            <a:prstGeom prst="ellipse">
+              <a:avLst/>
+            </a:prstGeom>
+            <a:solidFill>
+              <a:srgbClr val="E7E5E4"/>
+            </a:solidFill>
+            <a:ln w="6350">
+              <a:solidFill>
+                <a:srgbClr val="E7E5E4"/>
+              </a:solidFill>
+            </a:ln>
+          </p:spPr>
+          <p:style>
+            <a:lnRef idx="2">
+              <a:schemeClr val="accent1">
+                <a:shade val="50000"/>
+              </a:schemeClr>
+            </a:lnRef>
+            <a:fillRef idx="1">
+              <a:schemeClr val="accent1"/>
+            </a:fillRef>
+            <a:effectRef idx="0">
+              <a:schemeClr val="accent1"/>
+            </a:effectRef>
+            <a:fontRef idx="minor">
+              <a:schemeClr val="lt1"/>
+            </a:fontRef>
+          </p:style>
+          <p:txBody>
+            <a:bodyPr rtlCol="0" anchor="ctr"/>
+            <a:lstStyle/>
+            <a:p>
+              <a:pPr algn="ctr"/>
+              <a:endParaRPr lang="en-US"/>
+            </a:p>
+          </p:txBody>
+        </p:sp>
+        <p:sp>
+          <p:nvSpPr>
+            <p:cNvPr id="58" name="Oval 57">
+              <a:extLst>
+                <a:ext uri="{FF2B5EF4-FFF2-40B4-BE49-F238E27FC236}">
+                  <a16:creationId xmlns:a16="http://schemas.microsoft.com/office/drawing/2014/main" id="{8935191A-6671-156A-5A4C-115650EBE74B}"/>
+                </a:ext>
+              </a:extLst>
+            </p:cNvPr>
+            <p:cNvSpPr>
+              <a:spLocks noChangeAspect="1"/>
+            </p:cNvSpPr>
+            <p:nvPr/>
+          </p:nvSpPr>
+          <p:spPr>
+            <a:xfrm>
+              <a:off x="7429116" y="3082682"/>
+              <a:ext cx="72000" cy="72000"/>
+            </a:xfrm>
+            <a:prstGeom prst="ellipse">
+              <a:avLst/>
+            </a:prstGeom>
+            <a:solidFill>
+              <a:srgbClr val="E7E5E4"/>
+            </a:solidFill>
+            <a:ln w="6350">
+              <a:solidFill>
+                <a:srgbClr val="E7E5E4"/>
+              </a:solidFill>
+            </a:ln>
+          </p:spPr>
+          <p:style>
+            <a:lnRef idx="2">
+              <a:schemeClr val="accent1">
+                <a:shade val="50000"/>
+              </a:schemeClr>
+            </a:lnRef>
+            <a:fillRef idx="1">
+              <a:schemeClr val="accent1"/>
+            </a:fillRef>
+            <a:effectRef idx="0">
+              <a:schemeClr val="accent1"/>
+            </a:effectRef>
+            <a:fontRef idx="minor">
+              <a:schemeClr val="lt1"/>
+            </a:fontRef>
+          </p:style>
+          <p:txBody>
+            <a:bodyPr rtlCol="0" anchor="ctr"/>
+            <a:lstStyle/>
+            <a:p>
+              <a:pPr algn="ctr"/>
+              <a:endParaRPr lang="en-US"/>
+            </a:p>
+          </p:txBody>
+        </p:sp>
+        <p:sp>
+          <p:nvSpPr>
+            <p:cNvPr id="59" name="Oval 58">
+              <a:extLst>
+                <a:ext uri="{FF2B5EF4-FFF2-40B4-BE49-F238E27FC236}">
+                  <a16:creationId xmlns:a16="http://schemas.microsoft.com/office/drawing/2014/main" id="{C33A078A-6563-B2AD-7B21-86E1258424A0}"/>
+                </a:ext>
+              </a:extLst>
+            </p:cNvPr>
+            <p:cNvSpPr>
+              <a:spLocks noChangeAspect="1"/>
+            </p:cNvSpPr>
+            <p:nvPr/>
+          </p:nvSpPr>
+          <p:spPr>
+            <a:xfrm>
+              <a:off x="7429116" y="3298682"/>
+              <a:ext cx="72000" cy="72000"/>
+            </a:xfrm>
+            <a:prstGeom prst="ellipse">
+              <a:avLst/>
+            </a:prstGeom>
+            <a:solidFill>
+              <a:srgbClr val="E7E5E4"/>
+            </a:solidFill>
+            <a:ln w="6350">
+              <a:solidFill>
+                <a:srgbClr val="E7E5E4"/>
+              </a:solidFill>
+            </a:ln>
+          </p:spPr>
+          <p:style>
+            <a:lnRef idx="2">
+              <a:schemeClr val="accent1">
+                <a:shade val="50000"/>
+              </a:schemeClr>
+            </a:lnRef>
+            <a:fillRef idx="1">
+              <a:schemeClr val="accent1"/>
+            </a:fillRef>
+            <a:effectRef idx="0">
+              <a:schemeClr val="accent1"/>
+            </a:effectRef>
+            <a:fontRef idx="minor">
+              <a:schemeClr val="lt1"/>
+            </a:fontRef>
+          </p:style>
+          <p:txBody>
+            <a:bodyPr rtlCol="0" anchor="ctr"/>
+            <a:lstStyle/>
+            <a:p>
+              <a:pPr algn="ctr"/>
+              <a:endParaRPr lang="en-US"/>
+            </a:p>
+          </p:txBody>
+        </p:sp>
+        <p:sp>
+          <p:nvSpPr>
+            <p:cNvPr id="60" name="Oval 59">
+              <a:extLst>
+                <a:ext uri="{FF2B5EF4-FFF2-40B4-BE49-F238E27FC236}">
+                  <a16:creationId xmlns:a16="http://schemas.microsoft.com/office/drawing/2014/main" id="{087D2CAC-66DB-F36C-5261-1C77DBA4A7B3}"/>
+                </a:ext>
+              </a:extLst>
+            </p:cNvPr>
+            <p:cNvSpPr>
+              <a:spLocks noChangeAspect="1"/>
+            </p:cNvSpPr>
+            <p:nvPr/>
+          </p:nvSpPr>
+          <p:spPr>
+            <a:xfrm>
+              <a:off x="7429116" y="3514682"/>
+              <a:ext cx="72000" cy="72000"/>
+            </a:xfrm>
+            <a:prstGeom prst="ellipse">
+              <a:avLst/>
+            </a:prstGeom>
+            <a:solidFill>
+              <a:srgbClr val="E7E5E4"/>
+            </a:solidFill>
+            <a:ln w="6350">
+              <a:solidFill>
+                <a:srgbClr val="E7E5E4"/>
+              </a:solidFill>
+            </a:ln>
+          </p:spPr>
+          <p:style>
+            <a:lnRef idx="2">
+              <a:schemeClr val="accent1">
+                <a:shade val="50000"/>
+              </a:schemeClr>
+            </a:lnRef>
+            <a:fillRef idx="1">
+              <a:schemeClr val="accent1"/>
+            </a:fillRef>
+            <a:effectRef idx="0">
+              <a:schemeClr val="accent1"/>
+            </a:effectRef>
+            <a:fontRef idx="minor">
+              <a:schemeClr val="lt1"/>
+            </a:fontRef>
+          </p:style>
+          <p:txBody>
+            <a:bodyPr rtlCol="0" anchor="ctr"/>
+            <a:lstStyle/>
+            <a:p>
+              <a:pPr algn="ctr"/>
+              <a:endParaRPr lang="en-US"/>
+            </a:p>
+          </p:txBody>
+        </p:sp>
+        <p:sp>
+          <p:nvSpPr>
+            <p:cNvPr id="61" name="Oval 60">
+              <a:extLst>
+                <a:ext uri="{FF2B5EF4-FFF2-40B4-BE49-F238E27FC236}">
+                  <a16:creationId xmlns:a16="http://schemas.microsoft.com/office/drawing/2014/main" id="{751E0A8E-54B7-13E2-3C9D-41BA94669285}"/>
+                </a:ext>
+              </a:extLst>
+            </p:cNvPr>
+            <p:cNvSpPr>
+              <a:spLocks noChangeAspect="1"/>
+            </p:cNvSpPr>
+            <p:nvPr/>
+          </p:nvSpPr>
+          <p:spPr>
+            <a:xfrm>
+              <a:off x="7222650" y="2866682"/>
+              <a:ext cx="72000" cy="72000"/>
+            </a:xfrm>
+            <a:prstGeom prst="ellipse">
+              <a:avLst/>
+            </a:prstGeom>
+            <a:solidFill>
+              <a:srgbClr val="E7E5E4"/>
+            </a:solidFill>
+            <a:ln w="6350">
+              <a:solidFill>
+                <a:srgbClr val="E7E5E4"/>
+              </a:solidFill>
+            </a:ln>
+          </p:spPr>
+          <p:style>
+            <a:lnRef idx="2">
+              <a:schemeClr val="accent1">
+                <a:shade val="50000"/>
+              </a:schemeClr>
+            </a:lnRef>
+            <a:fillRef idx="1">
+              <a:schemeClr val="accent1"/>
+            </a:fillRef>
+            <a:effectRef idx="0">
+              <a:schemeClr val="accent1"/>
+            </a:effectRef>
+            <a:fontRef idx="minor">
+              <a:schemeClr val="lt1"/>
+            </a:fontRef>
+          </p:style>
+          <p:txBody>
+            <a:bodyPr rtlCol="0" anchor="ctr"/>
+            <a:lstStyle/>
+            <a:p>
+              <a:pPr algn="ctr"/>
+              <a:endParaRPr lang="en-US"/>
+            </a:p>
+          </p:txBody>
+        </p:sp>
+        <p:sp>
+          <p:nvSpPr>
+            <p:cNvPr id="62" name="Oval 61">
+              <a:extLst>
+                <a:ext uri="{FF2B5EF4-FFF2-40B4-BE49-F238E27FC236}">
+                  <a16:creationId xmlns:a16="http://schemas.microsoft.com/office/drawing/2014/main" id="{B06E2E8F-159F-3406-893B-1AE5FDF9B06B}"/>
+                </a:ext>
+              </a:extLst>
+            </p:cNvPr>
+            <p:cNvSpPr>
+              <a:spLocks noChangeAspect="1"/>
+            </p:cNvSpPr>
+            <p:nvPr/>
+          </p:nvSpPr>
+          <p:spPr>
+            <a:xfrm>
+              <a:off x="7222650" y="3082682"/>
+              <a:ext cx="72000" cy="72000"/>
+            </a:xfrm>
+            <a:prstGeom prst="ellipse">
+              <a:avLst/>
+            </a:prstGeom>
+            <a:solidFill>
+              <a:srgbClr val="E7E5E4"/>
+            </a:solidFill>
+            <a:ln w="6350">
+              <a:solidFill>
+                <a:srgbClr val="E7E5E4"/>
+              </a:solidFill>
+            </a:ln>
+          </p:spPr>
+          <p:style>
+            <a:lnRef idx="2">
+              <a:schemeClr val="accent1">
+                <a:shade val="50000"/>
+              </a:schemeClr>
+            </a:lnRef>
+            <a:fillRef idx="1">
+              <a:schemeClr val="accent1"/>
+            </a:fillRef>
+            <a:effectRef idx="0">
+              <a:schemeClr val="accent1"/>
+            </a:effectRef>
+            <a:fontRef idx="minor">
+              <a:schemeClr val="lt1"/>
+            </a:fontRef>
+          </p:style>
+          <p:txBody>
+            <a:bodyPr rtlCol="0" anchor="ctr"/>
+            <a:lstStyle/>
+            <a:p>
+              <a:pPr algn="ctr"/>
+              <a:endParaRPr lang="en-US"/>
+            </a:p>
+          </p:txBody>
+        </p:sp>
+        <p:sp>
+          <p:nvSpPr>
+            <p:cNvPr id="63" name="Oval 62">
+              <a:extLst>
+                <a:ext uri="{FF2B5EF4-FFF2-40B4-BE49-F238E27FC236}">
+                  <a16:creationId xmlns:a16="http://schemas.microsoft.com/office/drawing/2014/main" id="{CB55B1EA-4621-435C-4B08-71FDF4938B37}"/>
+                </a:ext>
+              </a:extLst>
+            </p:cNvPr>
+            <p:cNvSpPr>
+              <a:spLocks noChangeAspect="1"/>
+            </p:cNvSpPr>
+            <p:nvPr/>
+          </p:nvSpPr>
+          <p:spPr>
+            <a:xfrm>
+              <a:off x="7222650" y="3298682"/>
+              <a:ext cx="72000" cy="72000"/>
+            </a:xfrm>
+            <a:prstGeom prst="ellipse">
+              <a:avLst/>
+            </a:prstGeom>
+            <a:solidFill>
+              <a:srgbClr val="E7E5E4"/>
+            </a:solidFill>
+            <a:ln w="6350">
+              <a:solidFill>
+                <a:srgbClr val="E7E5E4"/>
+              </a:solidFill>
+            </a:ln>
+          </p:spPr>
+          <p:style>
+            <a:lnRef idx="2">
+              <a:schemeClr val="accent1">
+                <a:shade val="50000"/>
+              </a:schemeClr>
+            </a:lnRef>
+            <a:fillRef idx="1">
+              <a:schemeClr val="accent1"/>
+            </a:fillRef>
+            <a:effectRef idx="0">
+              <a:schemeClr val="accent1"/>
+            </a:effectRef>
+            <a:fontRef idx="minor">
+              <a:schemeClr val="lt1"/>
+            </a:fontRef>
+          </p:style>
+          <p:txBody>
+            <a:bodyPr rtlCol="0" anchor="ctr"/>
+            <a:lstStyle/>
+            <a:p>
+              <a:pPr algn="ctr"/>
+              <a:endParaRPr lang="en-US"/>
+            </a:p>
+          </p:txBody>
+        </p:sp>
+        <p:sp>
+          <p:nvSpPr>
+            <p:cNvPr id="64" name="Oval 63">
+              <a:extLst>
+                <a:ext uri="{FF2B5EF4-FFF2-40B4-BE49-F238E27FC236}">
+                  <a16:creationId xmlns:a16="http://schemas.microsoft.com/office/drawing/2014/main" id="{35037C10-5091-EBFB-2AEA-7844E83A5088}"/>
+                </a:ext>
+              </a:extLst>
+            </p:cNvPr>
+            <p:cNvSpPr>
+              <a:spLocks noChangeAspect="1"/>
+            </p:cNvSpPr>
+            <p:nvPr/>
+          </p:nvSpPr>
+          <p:spPr>
+            <a:xfrm>
+              <a:off x="7222650" y="3514682"/>
+              <a:ext cx="72000" cy="72000"/>
+            </a:xfrm>
+            <a:prstGeom prst="ellipse">
+              <a:avLst/>
+            </a:prstGeom>
+            <a:solidFill>
+              <a:srgbClr val="E7E5E4"/>
+            </a:solidFill>
+            <a:ln w="6350">
+              <a:solidFill>
+                <a:srgbClr val="E7E5E4"/>
+              </a:solidFill>
+            </a:ln>
+          </p:spPr>
+          <p:style>
+            <a:lnRef idx="2">
+              <a:schemeClr val="accent1">
+                <a:shade val="50000"/>
+              </a:schemeClr>
+            </a:lnRef>
+            <a:fillRef idx="1">
+              <a:schemeClr val="accent1"/>
+            </a:fillRef>
+            <a:effectRef idx="0">
+              <a:schemeClr val="accent1"/>
+            </a:effectRef>
+            <a:fontRef idx="minor">
+              <a:schemeClr val="lt1"/>
+            </a:fontRef>
+          </p:style>
+          <p:txBody>
+            <a:bodyPr rtlCol="0" anchor="ctr"/>
+            <a:lstStyle/>
+            <a:p>
+              <a:pPr algn="ctr"/>
+              <a:endParaRPr lang="en-US"/>
+            </a:p>
+          </p:txBody>
+        </p:sp>
+        <p:sp>
+          <p:nvSpPr>
+            <p:cNvPr id="65" name="Oval 64">
+              <a:extLst>
+                <a:ext uri="{FF2B5EF4-FFF2-40B4-BE49-F238E27FC236}">
+                  <a16:creationId xmlns:a16="http://schemas.microsoft.com/office/drawing/2014/main" id="{2FF61276-6099-4270-F73E-7B65249657EB}"/>
+                </a:ext>
+              </a:extLst>
+            </p:cNvPr>
+            <p:cNvSpPr>
+              <a:spLocks noChangeAspect="1"/>
+            </p:cNvSpPr>
+            <p:nvPr/>
+          </p:nvSpPr>
+          <p:spPr>
+            <a:xfrm>
+              <a:off x="7016184" y="2866682"/>
+              <a:ext cx="72000" cy="72000"/>
+            </a:xfrm>
+            <a:prstGeom prst="ellipse">
+              <a:avLst/>
+            </a:prstGeom>
+            <a:solidFill>
+              <a:srgbClr val="E7E5E4"/>
+            </a:solidFill>
+            <a:ln w="6350">
+              <a:solidFill>
+                <a:srgbClr val="E7E5E4"/>
+              </a:solidFill>
+            </a:ln>
+          </p:spPr>
+          <p:style>
+            <a:lnRef idx="2">
+              <a:schemeClr val="accent1">
+                <a:shade val="50000"/>
+              </a:schemeClr>
+            </a:lnRef>
+            <a:fillRef idx="1">
+              <a:schemeClr val="accent1"/>
+            </a:fillRef>
+            <a:effectRef idx="0">
+              <a:schemeClr val="accent1"/>
+            </a:effectRef>
+            <a:fontRef idx="minor">
+              <a:schemeClr val="lt1"/>
+            </a:fontRef>
+          </p:style>
+          <p:txBody>
+            <a:bodyPr rtlCol="0" anchor="ctr"/>
+            <a:lstStyle/>
+            <a:p>
+              <a:pPr algn="ctr"/>
+              <a:endParaRPr lang="en-US"/>
+            </a:p>
+          </p:txBody>
+        </p:sp>
+        <p:sp>
+          <p:nvSpPr>
+            <p:cNvPr id="66" name="Oval 65">
+              <a:extLst>
+                <a:ext uri="{FF2B5EF4-FFF2-40B4-BE49-F238E27FC236}">
+                  <a16:creationId xmlns:a16="http://schemas.microsoft.com/office/drawing/2014/main" id="{FC2A15B2-0593-35E7-BC46-59DC1D0028D2}"/>
+                </a:ext>
+              </a:extLst>
+            </p:cNvPr>
+            <p:cNvSpPr>
+              <a:spLocks noChangeAspect="1"/>
+            </p:cNvSpPr>
+            <p:nvPr/>
+          </p:nvSpPr>
+          <p:spPr>
+            <a:xfrm>
+              <a:off x="7016184" y="3082682"/>
+              <a:ext cx="72000" cy="72000"/>
+            </a:xfrm>
+            <a:prstGeom prst="ellipse">
+              <a:avLst/>
+            </a:prstGeom>
+            <a:solidFill>
+              <a:srgbClr val="E7E5E4"/>
+            </a:solidFill>
+            <a:ln w="6350">
+              <a:solidFill>
+                <a:srgbClr val="E7E5E4"/>
+              </a:solidFill>
+            </a:ln>
+          </p:spPr>
+          <p:style>
+            <a:lnRef idx="2">
+              <a:schemeClr val="accent1">
+                <a:shade val="50000"/>
+              </a:schemeClr>
+            </a:lnRef>
+            <a:fillRef idx="1">
+              <a:schemeClr val="accent1"/>
+            </a:fillRef>
+            <a:effectRef idx="0">
+              <a:schemeClr val="accent1"/>
+            </a:effectRef>
+            <a:fontRef idx="minor">
+              <a:schemeClr val="lt1"/>
+            </a:fontRef>
+          </p:style>
+          <p:txBody>
+            <a:bodyPr rtlCol="0" anchor="ctr"/>
+            <a:lstStyle/>
+            <a:p>
+              <a:pPr algn="ctr"/>
+              <a:endParaRPr lang="en-US"/>
+            </a:p>
+          </p:txBody>
+        </p:sp>
+        <p:sp>
+          <p:nvSpPr>
+            <p:cNvPr id="67" name="Oval 66">
+              <a:extLst>
+                <a:ext uri="{FF2B5EF4-FFF2-40B4-BE49-F238E27FC236}">
+                  <a16:creationId xmlns:a16="http://schemas.microsoft.com/office/drawing/2014/main" id="{7C25B240-86E3-0A66-0992-845AA29B01C4}"/>
+                </a:ext>
+              </a:extLst>
+            </p:cNvPr>
+            <p:cNvSpPr>
+              <a:spLocks noChangeAspect="1"/>
+            </p:cNvSpPr>
+            <p:nvPr/>
+          </p:nvSpPr>
+          <p:spPr>
+            <a:xfrm>
+              <a:off x="7016184" y="3298682"/>
+              <a:ext cx="72000" cy="72000"/>
+            </a:xfrm>
+            <a:prstGeom prst="ellipse">
+              <a:avLst/>
+            </a:prstGeom>
+            <a:solidFill>
+              <a:srgbClr val="E7E5E4"/>
+            </a:solidFill>
+            <a:ln w="6350">
+              <a:solidFill>
+                <a:srgbClr val="E7E5E4"/>
+              </a:solidFill>
+            </a:ln>
+          </p:spPr>
+          <p:style>
+            <a:lnRef idx="2">
+              <a:schemeClr val="accent1">
+                <a:shade val="50000"/>
+              </a:schemeClr>
+            </a:lnRef>
+            <a:fillRef idx="1">
+              <a:schemeClr val="accent1"/>
+            </a:fillRef>
+            <a:effectRef idx="0">
+              <a:schemeClr val="accent1"/>
+            </a:effectRef>
+            <a:fontRef idx="minor">
+              <a:schemeClr val="lt1"/>
+            </a:fontRef>
+          </p:style>
+          <p:txBody>
+            <a:bodyPr rtlCol="0" anchor="ctr"/>
+            <a:lstStyle/>
+            <a:p>
+              <a:pPr algn="ctr"/>
+              <a:endParaRPr lang="en-US"/>
+            </a:p>
+          </p:txBody>
+        </p:sp>
+        <p:sp>
+          <p:nvSpPr>
+            <p:cNvPr id="68" name="Oval 67">
+              <a:extLst>
+                <a:ext uri="{FF2B5EF4-FFF2-40B4-BE49-F238E27FC236}">
+                  <a16:creationId xmlns:a16="http://schemas.microsoft.com/office/drawing/2014/main" id="{3F608C07-7E6E-42B1-6ADC-303BC17FE11C}"/>
+                </a:ext>
+              </a:extLst>
+            </p:cNvPr>
+            <p:cNvSpPr>
+              <a:spLocks noChangeAspect="1"/>
+            </p:cNvSpPr>
+            <p:nvPr/>
+          </p:nvSpPr>
+          <p:spPr>
+            <a:xfrm>
+              <a:off x="7016184" y="3514682"/>
+              <a:ext cx="72000" cy="72000"/>
+            </a:xfrm>
+            <a:prstGeom prst="ellipse">
+              <a:avLst/>
+            </a:prstGeom>
+            <a:solidFill>
+              <a:srgbClr val="E7E5E4"/>
+            </a:solidFill>
+            <a:ln w="6350">
+              <a:solidFill>
+                <a:srgbClr val="E7E5E4"/>
+              </a:solidFill>
+            </a:ln>
+          </p:spPr>
+          <p:style>
+            <a:lnRef idx="2">
+              <a:schemeClr val="accent1">
+                <a:shade val="50000"/>
+              </a:schemeClr>
+            </a:lnRef>
+            <a:fillRef idx="1">
+              <a:schemeClr val="accent1"/>
+            </a:fillRef>
+            <a:effectRef idx="0">
+              <a:schemeClr val="accent1"/>
+            </a:effectRef>
+            <a:fontRef idx="minor">
+              <a:schemeClr val="lt1"/>
+            </a:fontRef>
+          </p:style>
+          <p:txBody>
+            <a:bodyPr rtlCol="0" anchor="ctr"/>
+            <a:lstStyle/>
+            <a:p>
+              <a:pPr algn="ctr"/>
+              <a:endParaRPr lang="en-US"/>
+            </a:p>
+          </p:txBody>
+        </p:sp>
+        <p:sp>
+          <p:nvSpPr>
+            <p:cNvPr id="69" name="Oval 68">
+              <a:extLst>
+                <a:ext uri="{FF2B5EF4-FFF2-40B4-BE49-F238E27FC236}">
+                  <a16:creationId xmlns:a16="http://schemas.microsoft.com/office/drawing/2014/main" id="{7AE7873B-6770-8544-9B97-A9087C73BEE4}"/>
+                </a:ext>
+              </a:extLst>
+            </p:cNvPr>
+            <p:cNvSpPr>
+              <a:spLocks noChangeAspect="1"/>
+            </p:cNvSpPr>
+            <p:nvPr/>
+          </p:nvSpPr>
+          <p:spPr>
+            <a:xfrm>
+              <a:off x="6809718" y="2866682"/>
+              <a:ext cx="72000" cy="72000"/>
+            </a:xfrm>
+            <a:prstGeom prst="ellipse">
+              <a:avLst/>
+            </a:prstGeom>
+            <a:solidFill>
+              <a:srgbClr val="E7E5E4"/>
+            </a:solidFill>
+            <a:ln w="6350">
+              <a:solidFill>
+                <a:srgbClr val="E7E5E4"/>
+              </a:solidFill>
+            </a:ln>
+          </p:spPr>
+          <p:style>
+            <a:lnRef idx="2">
+              <a:schemeClr val="accent1">
+                <a:shade val="50000"/>
+              </a:schemeClr>
+            </a:lnRef>
+            <a:fillRef idx="1">
+              <a:schemeClr val="accent1"/>
+            </a:fillRef>
+            <a:effectRef idx="0">
+              <a:schemeClr val="accent1"/>
+            </a:effectRef>
+            <a:fontRef idx="minor">
+              <a:schemeClr val="lt1"/>
+            </a:fontRef>
+          </p:style>
+          <p:txBody>
+            <a:bodyPr rtlCol="0" anchor="ctr"/>
+            <a:lstStyle/>
+            <a:p>
+              <a:pPr algn="ctr"/>
+              <a:endParaRPr lang="en-US"/>
+            </a:p>
+          </p:txBody>
+        </p:sp>
+        <p:sp>
+          <p:nvSpPr>
+            <p:cNvPr id="70" name="Oval 69">
+              <a:extLst>
+                <a:ext uri="{FF2B5EF4-FFF2-40B4-BE49-F238E27FC236}">
+                  <a16:creationId xmlns:a16="http://schemas.microsoft.com/office/drawing/2014/main" id="{25188225-44F5-164A-88ED-CEF36B7DADAF}"/>
+                </a:ext>
+              </a:extLst>
+            </p:cNvPr>
+            <p:cNvSpPr>
+              <a:spLocks noChangeAspect="1"/>
+            </p:cNvSpPr>
+            <p:nvPr/>
+          </p:nvSpPr>
+          <p:spPr>
+            <a:xfrm>
+              <a:off x="6809718" y="3082682"/>
+              <a:ext cx="72000" cy="72000"/>
+            </a:xfrm>
+            <a:prstGeom prst="ellipse">
+              <a:avLst/>
+            </a:prstGeom>
+            <a:solidFill>
+              <a:srgbClr val="E7E5E4"/>
+            </a:solidFill>
+            <a:ln w="6350">
+              <a:solidFill>
+                <a:srgbClr val="E7E5E4"/>
+              </a:solidFill>
+            </a:ln>
+          </p:spPr>
+          <p:style>
+            <a:lnRef idx="2">
+              <a:schemeClr val="accent1">
+                <a:shade val="50000"/>
+              </a:schemeClr>
+            </a:lnRef>
+            <a:fillRef idx="1">
+              <a:schemeClr val="accent1"/>
+            </a:fillRef>
+            <a:effectRef idx="0">
+              <a:schemeClr val="accent1"/>
+            </a:effectRef>
+            <a:fontRef idx="minor">
+              <a:schemeClr val="lt1"/>
+            </a:fontRef>
+          </p:style>
+          <p:txBody>
+            <a:bodyPr rtlCol="0" anchor="ctr"/>
+            <a:lstStyle/>
+            <a:p>
+              <a:pPr algn="ctr"/>
+              <a:endParaRPr lang="en-US"/>
+            </a:p>
+          </p:txBody>
+        </p:sp>
+        <p:sp>
+          <p:nvSpPr>
+            <p:cNvPr id="71" name="Oval 70">
+              <a:extLst>
+                <a:ext uri="{FF2B5EF4-FFF2-40B4-BE49-F238E27FC236}">
+                  <a16:creationId xmlns:a16="http://schemas.microsoft.com/office/drawing/2014/main" id="{6B9F93CA-72C2-999B-EF8F-4BFE3574A7FA}"/>
+                </a:ext>
+              </a:extLst>
+            </p:cNvPr>
+            <p:cNvSpPr>
+              <a:spLocks noChangeAspect="1"/>
+            </p:cNvSpPr>
+            <p:nvPr/>
+          </p:nvSpPr>
+          <p:spPr>
+            <a:xfrm>
+              <a:off x="6809718" y="3298682"/>
+              <a:ext cx="72000" cy="72000"/>
+            </a:xfrm>
+            <a:prstGeom prst="ellipse">
+              <a:avLst/>
+            </a:prstGeom>
+            <a:solidFill>
+              <a:srgbClr val="E7E5E4"/>
+            </a:solidFill>
+            <a:ln w="6350">
+              <a:solidFill>
+                <a:srgbClr val="E7E5E4"/>
+              </a:solidFill>
+            </a:ln>
+          </p:spPr>
+          <p:style>
+            <a:lnRef idx="2">
+              <a:schemeClr val="accent1">
+                <a:shade val="50000"/>
+              </a:schemeClr>
+            </a:lnRef>
+            <a:fillRef idx="1">
+              <a:schemeClr val="accent1"/>
+            </a:fillRef>
+            <a:effectRef idx="0">
+              <a:schemeClr val="accent1"/>
+            </a:effectRef>
+            <a:fontRef idx="minor">
+              <a:schemeClr val="lt1"/>
+            </a:fontRef>
+          </p:style>
+          <p:txBody>
+            <a:bodyPr rtlCol="0" anchor="ctr"/>
+            <a:lstStyle/>
+            <a:p>
+              <a:pPr algn="ctr"/>
+              <a:endParaRPr lang="en-US"/>
+            </a:p>
+          </p:txBody>
+        </p:sp>
+        <p:sp>
+          <p:nvSpPr>
+            <p:cNvPr id="72" name="Oval 71">
+              <a:extLst>
+                <a:ext uri="{FF2B5EF4-FFF2-40B4-BE49-F238E27FC236}">
+                  <a16:creationId xmlns:a16="http://schemas.microsoft.com/office/drawing/2014/main" id="{44BE8DEB-93AF-250C-E44B-8CF8AFFD301D}"/>
+                </a:ext>
+              </a:extLst>
+            </p:cNvPr>
+            <p:cNvSpPr>
+              <a:spLocks noChangeAspect="1"/>
+            </p:cNvSpPr>
+            <p:nvPr/>
+          </p:nvSpPr>
+          <p:spPr>
+            <a:xfrm>
+              <a:off x="6809718" y="3514682"/>
+              <a:ext cx="72000" cy="72000"/>
+            </a:xfrm>
+            <a:prstGeom prst="ellipse">
+              <a:avLst/>
+            </a:prstGeom>
+            <a:solidFill>
+              <a:srgbClr val="E7E5E4"/>
+            </a:solidFill>
+            <a:ln w="6350">
+              <a:solidFill>
+                <a:srgbClr val="E7E5E4"/>
+              </a:solidFill>
+            </a:ln>
+          </p:spPr>
+          <p:style>
+            <a:lnRef idx="2">
+              <a:schemeClr val="accent1">
+                <a:shade val="50000"/>
+              </a:schemeClr>
+            </a:lnRef>
+            <a:fillRef idx="1">
+              <a:schemeClr val="accent1"/>
+            </a:fillRef>
+            <a:effectRef idx="0">
+              <a:schemeClr val="accent1"/>
+            </a:effectRef>
+            <a:fontRef idx="minor">
+              <a:schemeClr val="lt1"/>
+            </a:fontRef>
+          </p:style>
+          <p:txBody>
+            <a:bodyPr rtlCol="0" anchor="ctr"/>
+            <a:lstStyle/>
+            <a:p>
+              <a:pPr algn="ctr"/>
+              <a:endParaRPr lang="en-US"/>
+            </a:p>
+          </p:txBody>
+        </p:sp>
+      </p:grpSp>
+      <p:grpSp>
+        <p:nvGrpSpPr>
+          <p:cNvPr id="7" name="Group 6">
+            <a:extLst>
+              <a:ext uri="{FF2B5EF4-FFF2-40B4-BE49-F238E27FC236}">
+                <a16:creationId xmlns:a16="http://schemas.microsoft.com/office/drawing/2014/main" id="{41B59C31-DCDF-C94B-2AA0-046C4BB20D9A}"/>
+              </a:ext>
+            </a:extLst>
+          </p:cNvPr>
+          <p:cNvGrpSpPr/>
+          <p:nvPr/>
+        </p:nvGrpSpPr>
+        <p:grpSpPr>
+          <a:xfrm>
+            <a:off x="6539900" y="2480956"/>
+            <a:ext cx="1872000" cy="1872000"/>
+            <a:chOff x="6539900" y="2480956"/>
+            <a:chExt cx="1872000" cy="1872000"/>
+          </a:xfrm>
+        </p:grpSpPr>
+        <p:sp>
+          <p:nvSpPr>
+            <p:cNvPr id="77" name="Rectangle 76">
+              <a:extLst>
+                <a:ext uri="{FF2B5EF4-FFF2-40B4-BE49-F238E27FC236}">
+                  <a16:creationId xmlns:a16="http://schemas.microsoft.com/office/drawing/2014/main" id="{BD9A5766-45BB-BA5A-B0CD-CCF7EC934962}"/>
+                </a:ext>
+              </a:extLst>
+            </p:cNvPr>
+            <p:cNvSpPr/>
+            <p:nvPr/>
+          </p:nvSpPr>
+          <p:spPr>
+            <a:xfrm>
+              <a:off x="6539900" y="2480956"/>
+              <a:ext cx="1872000" cy="1872000"/>
+            </a:xfrm>
+            <a:prstGeom prst="rect">
+              <a:avLst/>
+            </a:prstGeom>
+            <a:solidFill>
+              <a:srgbClr val="1C1917"/>
+            </a:solidFill>
+          </p:spPr>
+          <p:style>
+            <a:lnRef idx="2">
+              <a:schemeClr val="accent1">
+                <a:shade val="50000"/>
+              </a:schemeClr>
+            </a:lnRef>
+            <a:fillRef idx="1">
+              <a:schemeClr val="accent1"/>
+            </a:fillRef>
+            <a:effectRef idx="0">
+              <a:schemeClr val="accent1"/>
+            </a:effectRef>
+            <a:fontRef idx="minor">
+              <a:schemeClr val="lt1"/>
+            </a:fontRef>
+          </p:style>
+          <p:txBody>
+            <a:bodyPr rtlCol="0" anchor="ctr"/>
+            <a:lstStyle/>
+            <a:p>
+              <a:pPr algn="ctr"/>
+              <a:endParaRPr lang="en-US"/>
+            </a:p>
+          </p:txBody>
+        </p:sp>
+        <p:sp>
+          <p:nvSpPr>
+            <p:cNvPr id="81" name="Double Brace 80">
+              <a:extLst>
+                <a:ext uri="{FF2B5EF4-FFF2-40B4-BE49-F238E27FC236}">
+                  <a16:creationId xmlns:a16="http://schemas.microsoft.com/office/drawing/2014/main" id="{6218A8FD-E189-6E2E-73EC-5D79091043D7}"/>
+                </a:ext>
+              </a:extLst>
+            </p:cNvPr>
+            <p:cNvSpPr/>
+            <p:nvPr/>
+          </p:nvSpPr>
+          <p:spPr>
+            <a:xfrm>
+              <a:off x="6809900" y="2750956"/>
+              <a:ext cx="1332000" cy="1332000"/>
+            </a:xfrm>
+            <a:prstGeom prst="bracePair">
+              <a:avLst>
+                <a:gd name="adj" fmla="val 17914"/>
+              </a:avLst>
+            </a:prstGeom>
+            <a:ln w="127000">
+              <a:solidFill>
+                <a:srgbClr val="E7E5E4"/>
+              </a:solidFill>
+            </a:ln>
+          </p:spPr>
+          <p:style>
+            <a:lnRef idx="1">
+              <a:schemeClr val="accent1"/>
+            </a:lnRef>
+            <a:fillRef idx="0">
+              <a:schemeClr val="accent1"/>
+            </a:fillRef>
+            <a:effectRef idx="0">
+              <a:schemeClr val="accent1"/>
+            </a:effectRef>
+            <a:fontRef idx="minor">
+              <a:schemeClr val="tx1"/>
+            </a:fontRef>
+          </p:style>
+          <p:txBody>
+            <a:bodyPr rtlCol="0" anchor="ctr"/>
+            <a:lstStyle/>
+            <a:p>
+              <a:pPr algn="ctr"/>
+              <a:endParaRPr lang="en-US"/>
+            </a:p>
+          </p:txBody>
+        </p:sp>
+      </p:grpSp>
+      <p:sp>
+        <p:nvSpPr>
+          <p:cNvPr id="3" name="Title 2">
+            <a:extLst>
+              <a:ext uri="{FF2B5EF4-FFF2-40B4-BE49-F238E27FC236}">
+                <a16:creationId xmlns:a16="http://schemas.microsoft.com/office/drawing/2014/main" id="{19326506-A0F5-F038-E17D-0825A800DC3B}"/>
+              </a:ext>
+            </a:extLst>
+          </p:cNvPr>
+          <p:cNvSpPr>
+            <a:spLocks noGrp="1"/>
+          </p:cNvSpPr>
+          <p:nvPr>
+            <p:ph type="title"/>
+          </p:nvPr>
+        </p:nvSpPr>
+        <p:spPr/>
+        <p:txBody>
+          <a:bodyPr/>
+          <a:lstStyle/>
+          <a:p>
+            <a:r>
+              <a:rPr lang="en-US" dirty="0"/>
+              <a:t>Background Warm-Gray-900</a:t>
+            </a:r>
+          </a:p>
+        </p:txBody>
+      </p:sp>
+    </p:spTree>
+    <p:extLst>
+      <p:ext uri="{BB962C8B-B14F-4D97-AF65-F5344CB8AC3E}">
+        <p14:creationId xmlns:p14="http://schemas.microsoft.com/office/powerpoint/2010/main" val="3221652295"/>
+      </p:ext>
+    </p:extLst>
+  </p:cSld>
+  <p:clrMapOvr>
+    <a:masterClrMapping/>
+  </p:clrMapOvr>
+</p:sld>
+</file>
+
+<file path=ppt/slides/slide2.xml><?xml version="1.0" encoding="utf-8"?>
+<p:sld xmlns:a="http://schemas.openxmlformats.org/drawingml/2006/main" xmlns:r="http://schemas.openxmlformats.org/officeDocument/2006/relationships" xmlns:p="http://schemas.openxmlformats.org/presentationml/2006/main">
+  <p:cSld>
+    <p:spTree>
+      <p:nvGrpSpPr>
+        <p:cNvPr id="1" name=""/>
+        <p:cNvGrpSpPr/>
+        <p:nvPr/>
+      </p:nvGrpSpPr>
+      <p:grpSpPr>
+        <a:xfrm>
+          <a:off x="0" y="0"/>
+          <a:ext cx="0" cy="0"/>
+          <a:chOff x="0" y="0"/>
+          <a:chExt cx="0" cy="0"/>
+        </a:xfrm>
+      </p:grpSpPr>
+      <p:grpSp>
+        <p:nvGrpSpPr>
+          <p:cNvPr id="2" name="Group 1">
+            <a:extLst>
+              <a:ext uri="{FF2B5EF4-FFF2-40B4-BE49-F238E27FC236}">
+                <a16:creationId xmlns:a16="http://schemas.microsoft.com/office/drawing/2014/main" id="{4F362434-B950-FA56-4FC8-ACA7E61FAE98}"/>
               </a:ext>
             </a:extLst>
           </p:cNvPr>
@@ -3788,9 +6075,9 @@
         <p:grpSpPr>
           <a:xfrm>
             <a:off x="1536700" y="2259000"/>
-            <a:ext cx="3960000" cy="2340000"/>
-            <a:chOff x="4171950" y="2044700"/>
-            <a:chExt cx="3960000" cy="2340000"/>
+            <a:ext cx="4320000" cy="2520000"/>
+            <a:chOff x="1536700" y="2259000"/>
+            <a:chExt cx="4320000" cy="2520000"/>
           </a:xfrm>
         </p:grpSpPr>
         <p:sp>
@@ -3807,8 +6094,8 @@
           </p:nvSpPr>
           <p:spPr>
             <a:xfrm>
-              <a:off x="4171950" y="2044700"/>
-              <a:ext cx="3960000" cy="2340000"/>
+              <a:off x="1536700" y="2259000"/>
+              <a:ext cx="4320000" cy="2520000"/>
             </a:xfrm>
             <a:prstGeom prst="rect">
               <a:avLst/>
@@ -3816,6 +6103,11 @@
             <a:solidFill>
               <a:srgbClr val="292524"/>
             </a:solidFill>
+            <a:ln>
+              <a:solidFill>
+                <a:srgbClr val="1C1917"/>
+              </a:solidFill>
+            </a:ln>
           </p:spPr>
           <p:style>
             <a:lnRef idx="2">
@@ -3855,8 +6147,8 @@
             <p:nvPr/>
           </p:nvGrpSpPr>
           <p:grpSpPr>
-            <a:xfrm rot="-900000">
-              <a:off x="4531950" y="2674700"/>
+            <a:xfrm rot="20700000">
+              <a:off x="2076700" y="2979000"/>
               <a:ext cx="3240000" cy="1080000"/>
               <a:chOff x="4476000" y="2686682"/>
               <a:chExt cx="3240000" cy="1080000"/>
@@ -5817,131 +8109,138 @@
           </p:sp>
         </p:grpSp>
       </p:grpSp>
-      <p:grpSp>
-        <p:nvGrpSpPr>
-          <p:cNvPr id="2" name="Group 1">
+      <p:sp>
+        <p:nvSpPr>
+          <p:cNvPr id="77" name="Rectangle 76">
             <a:extLst>
               <a:ext uri="{FF2B5EF4-FFF2-40B4-BE49-F238E27FC236}">
-                <a16:creationId xmlns:a16="http://schemas.microsoft.com/office/drawing/2014/main" id="{E5B49387-A72F-36CF-2D75-88B70BDC9E9B}"/>
+                <a16:creationId xmlns:a16="http://schemas.microsoft.com/office/drawing/2014/main" id="{BD9A5766-45BB-BA5A-B0CD-CCF7EC934962}"/>
               </a:ext>
             </a:extLst>
           </p:cNvPr>
-          <p:cNvGrpSpPr/>
+          <p:cNvSpPr/>
           <p:nvPr/>
-        </p:nvGrpSpPr>
-        <p:grpSpPr>
+        </p:nvSpPr>
+        <p:spPr>
           <a:xfrm>
             <a:off x="6539900" y="2480956"/>
             <a:ext cx="1872000" cy="1872000"/>
-            <a:chOff x="6539900" y="2480956"/>
-            <a:chExt cx="1872000" cy="1872000"/>
           </a:xfrm>
-        </p:grpSpPr>
-        <p:sp>
-          <p:nvSpPr>
-            <p:cNvPr id="77" name="Rectangle 76">
-              <a:extLst>
-                <a:ext uri="{FF2B5EF4-FFF2-40B4-BE49-F238E27FC236}">
-                  <a16:creationId xmlns:a16="http://schemas.microsoft.com/office/drawing/2014/main" id="{BD9A5766-45BB-BA5A-B0CD-CCF7EC934962}"/>
-                </a:ext>
-              </a:extLst>
-            </p:cNvPr>
-            <p:cNvSpPr/>
-            <p:nvPr/>
-          </p:nvSpPr>
-          <p:spPr>
-            <a:xfrm>
-              <a:off x="6539900" y="2480956"/>
-              <a:ext cx="1872000" cy="1872000"/>
-            </a:xfrm>
-            <a:prstGeom prst="rect">
-              <a:avLst/>
-            </a:prstGeom>
+          <a:prstGeom prst="rect">
+            <a:avLst/>
+          </a:prstGeom>
+          <a:solidFill>
+            <a:srgbClr val="292524"/>
+          </a:solidFill>
+        </p:spPr>
+        <p:style>
+          <a:lnRef idx="2">
+            <a:schemeClr val="accent1">
+              <a:shade val="50000"/>
+            </a:schemeClr>
+          </a:lnRef>
+          <a:fillRef idx="1">
+            <a:schemeClr val="accent1"/>
+          </a:fillRef>
+          <a:effectRef idx="0">
+            <a:schemeClr val="accent1"/>
+          </a:effectRef>
+          <a:fontRef idx="minor">
+            <a:schemeClr val="lt1"/>
+          </a:fontRef>
+        </p:style>
+        <p:txBody>
+          <a:bodyPr rtlCol="0" anchor="ctr"/>
+          <a:lstStyle/>
+          <a:p>
+            <a:pPr algn="ctr"/>
+            <a:endParaRPr lang="en-US"/>
+          </a:p>
+        </p:txBody>
+      </p:sp>
+      <p:sp>
+        <p:nvSpPr>
+          <p:cNvPr id="81" name="Double Brace 80">
+            <a:extLst>
+              <a:ext uri="{FF2B5EF4-FFF2-40B4-BE49-F238E27FC236}">
+                <a16:creationId xmlns:a16="http://schemas.microsoft.com/office/drawing/2014/main" id="{6218A8FD-E189-6E2E-73EC-5D79091043D7}"/>
+              </a:ext>
+            </a:extLst>
+          </p:cNvPr>
+          <p:cNvSpPr/>
+          <p:nvPr/>
+        </p:nvSpPr>
+        <p:spPr>
+          <a:xfrm>
+            <a:off x="6809900" y="2750956"/>
+            <a:ext cx="1332000" cy="1332000"/>
+          </a:xfrm>
+          <a:prstGeom prst="bracePair">
+            <a:avLst>
+              <a:gd name="adj" fmla="val 17914"/>
+            </a:avLst>
+          </a:prstGeom>
+          <a:ln w="127000">
             <a:solidFill>
-              <a:srgbClr val="292524"/>
+              <a:srgbClr val="E7E5E4"/>
             </a:solidFill>
-          </p:spPr>
-          <p:style>
-            <a:lnRef idx="2">
-              <a:schemeClr val="accent1">
-                <a:shade val="50000"/>
-              </a:schemeClr>
-            </a:lnRef>
-            <a:fillRef idx="1">
-              <a:schemeClr val="accent1"/>
-            </a:fillRef>
-            <a:effectRef idx="0">
-              <a:schemeClr val="accent1"/>
-            </a:effectRef>
-            <a:fontRef idx="minor">
-              <a:schemeClr val="lt1"/>
-            </a:fontRef>
-          </p:style>
-          <p:txBody>
-            <a:bodyPr rtlCol="0" anchor="ctr"/>
-            <a:lstStyle/>
-            <a:p>
-              <a:pPr algn="ctr"/>
-              <a:endParaRPr lang="en-US"/>
-            </a:p>
-          </p:txBody>
-        </p:sp>
-        <p:sp>
-          <p:nvSpPr>
-            <p:cNvPr id="81" name="Double Brace 80">
-              <a:extLst>
-                <a:ext uri="{FF2B5EF4-FFF2-40B4-BE49-F238E27FC236}">
-                  <a16:creationId xmlns:a16="http://schemas.microsoft.com/office/drawing/2014/main" id="{6218A8FD-E189-6E2E-73EC-5D79091043D7}"/>
-                </a:ext>
-              </a:extLst>
-            </p:cNvPr>
-            <p:cNvSpPr/>
-            <p:nvPr/>
-          </p:nvSpPr>
-          <p:spPr>
-            <a:xfrm>
-              <a:off x="6809900" y="2750956"/>
-              <a:ext cx="1332000" cy="1332000"/>
-            </a:xfrm>
-            <a:prstGeom prst="bracePair">
-              <a:avLst>
-                <a:gd name="adj" fmla="val 17914"/>
-              </a:avLst>
-            </a:prstGeom>
-            <a:ln w="127000">
-              <a:solidFill>
-                <a:srgbClr val="E7E5E4"/>
-              </a:solidFill>
-            </a:ln>
-          </p:spPr>
-          <p:style>
-            <a:lnRef idx="1">
-              <a:schemeClr val="accent1"/>
-            </a:lnRef>
-            <a:fillRef idx="0">
-              <a:schemeClr val="accent1"/>
-            </a:fillRef>
-            <a:effectRef idx="0">
-              <a:schemeClr val="accent1"/>
-            </a:effectRef>
-            <a:fontRef idx="minor">
-              <a:schemeClr val="tx1"/>
-            </a:fontRef>
-          </p:style>
-          <p:txBody>
-            <a:bodyPr rtlCol="0" anchor="ctr"/>
-            <a:lstStyle/>
-            <a:p>
-              <a:pPr algn="ctr"/>
-              <a:endParaRPr lang="en-US"/>
-            </a:p>
-          </p:txBody>
-        </p:sp>
-      </p:grpSp>
+          </a:ln>
+        </p:spPr>
+        <p:style>
+          <a:lnRef idx="1">
+            <a:schemeClr val="accent1"/>
+          </a:lnRef>
+          <a:fillRef idx="0">
+            <a:schemeClr val="accent1"/>
+          </a:fillRef>
+          <a:effectRef idx="0">
+            <a:schemeClr val="accent1"/>
+          </a:effectRef>
+          <a:fontRef idx="minor">
+            <a:schemeClr val="tx1"/>
+          </a:fontRef>
+        </p:style>
+        <p:txBody>
+          <a:bodyPr rtlCol="0" anchor="ctr"/>
+          <a:lstStyle/>
+          <a:p>
+            <a:pPr algn="ctr"/>
+            <a:endParaRPr lang="en-US"/>
+          </a:p>
+        </p:txBody>
+      </p:sp>
+      <p:sp>
+        <p:nvSpPr>
+          <p:cNvPr id="3" name="Title 2">
+            <a:extLst>
+              <a:ext uri="{FF2B5EF4-FFF2-40B4-BE49-F238E27FC236}">
+                <a16:creationId xmlns:a16="http://schemas.microsoft.com/office/drawing/2014/main" id="{19326506-A0F5-F038-E17D-0825A800DC3B}"/>
+              </a:ext>
+            </a:extLst>
+          </p:cNvPr>
+          <p:cNvSpPr>
+            <a:spLocks noGrp="1"/>
+          </p:cNvSpPr>
+          <p:nvPr>
+            <p:ph type="title"/>
+          </p:nvPr>
+        </p:nvSpPr>
+        <p:spPr/>
+        <p:txBody>
+          <a:bodyPr/>
+          <a:lstStyle/>
+          <a:p>
+            <a:r>
+              <a:rPr lang="en-US" dirty="0"/>
+              <a:t>Background Warm-Gray-800</a:t>
+            </a:r>
+          </a:p>
+        </p:txBody>
+      </p:sp>
     </p:spTree>
     <p:extLst>
       <p:ext uri="{BB962C8B-B14F-4D97-AF65-F5344CB8AC3E}">
-        <p14:creationId xmlns:p14="http://schemas.microsoft.com/office/powerpoint/2010/main" val="3221652295"/>
+        <p14:creationId xmlns:p14="http://schemas.microsoft.com/office/powerpoint/2010/main" val="2522709028"/>
       </p:ext>
     </p:extLst>
   </p:cSld>

</xml_diff>